<commit_message>
add links of real tb
</commit_message>
<xml_diff>
--- a/project_documentation/project_presentations/final_presentation/adp_final_presentation_v1.pptx
+++ b/project_documentation/project_presentations/final_presentation/adp_final_presentation_v1.pptx
@@ -1983,6 +1983,572 @@
                 <a:cs typeface="Arial" pitchFamily="34" charset="0"/>
               </a:rPr>
               <a:t>reality</a:t>
+            </a:r>
+            <a:r>
+              <a:rPr lang="tr-TR" sz="1200" b="0" i="0" u="none" strike="noStrike" kern="1200" dirty="0">
+                <a:solidFill>
+                  <a:schemeClr val="tx1"/>
+                </a:solidFill>
+                <a:effectLst/>
+                <a:latin typeface="Arial" pitchFamily="34" charset="0"/>
+                <a:ea typeface="+mn-ea"/>
+                <a:cs typeface="Arial" pitchFamily="34" charset="0"/>
+              </a:rPr>
+              <a:t>.</a:t>
+            </a:r>
+          </a:p>
+          <a:p>
+            <a:r>
+              <a:rPr lang="tr-TR" sz="1200" b="0" i="0" u="none" strike="noStrike" kern="1200" dirty="0">
+                <a:solidFill>
+                  <a:schemeClr val="tx1"/>
+                </a:solidFill>
+                <a:effectLst/>
+                <a:latin typeface="Arial" pitchFamily="34" charset="0"/>
+                <a:ea typeface="+mn-ea"/>
+                <a:cs typeface="Arial" pitchFamily="34" charset="0"/>
+              </a:rPr>
+              <a:t>Domain </a:t>
+            </a:r>
+            <a:r>
+              <a:rPr lang="tr-TR" sz="1200" b="0" i="0" u="none" strike="noStrike" kern="1200" dirty="0" err="1">
+                <a:solidFill>
+                  <a:schemeClr val="tx1"/>
+                </a:solidFill>
+                <a:effectLst/>
+                <a:latin typeface="Arial" pitchFamily="34" charset="0"/>
+                <a:ea typeface="+mn-ea"/>
+                <a:cs typeface="Arial" pitchFamily="34" charset="0"/>
+              </a:rPr>
+              <a:t>randomization</a:t>
+            </a:r>
+            <a:r>
+              <a:rPr lang="tr-TR" sz="1200" b="0" i="0" u="none" strike="noStrike" kern="1200" dirty="0">
+                <a:solidFill>
+                  <a:schemeClr val="tx1"/>
+                </a:solidFill>
+                <a:effectLst/>
+                <a:latin typeface="Arial" pitchFamily="34" charset="0"/>
+                <a:ea typeface="+mn-ea"/>
+                <a:cs typeface="Arial" pitchFamily="34" charset="0"/>
+              </a:rPr>
+              <a:t> </a:t>
+            </a:r>
+            <a:r>
+              <a:rPr lang="tr-TR" sz="1200" b="0" i="0" u="none" strike="noStrike" kern="1200" dirty="0" err="1">
+                <a:solidFill>
+                  <a:schemeClr val="tx1"/>
+                </a:solidFill>
+                <a:effectLst/>
+                <a:latin typeface="Arial" pitchFamily="34" charset="0"/>
+                <a:ea typeface="+mn-ea"/>
+                <a:cs typeface="Arial" pitchFamily="34" charset="0"/>
+              </a:rPr>
+              <a:t>techniques</a:t>
+            </a:r>
+            <a:r>
+              <a:rPr lang="tr-TR" sz="1200" b="0" i="0" u="none" strike="noStrike" kern="1200" dirty="0">
+                <a:solidFill>
+                  <a:schemeClr val="tx1"/>
+                </a:solidFill>
+                <a:effectLst/>
+                <a:latin typeface="Arial" pitchFamily="34" charset="0"/>
+                <a:ea typeface="+mn-ea"/>
+                <a:cs typeface="Arial" pitchFamily="34" charset="0"/>
+              </a:rPr>
+              <a:t> is </a:t>
+            </a:r>
+            <a:r>
+              <a:rPr lang="tr-TR" sz="1200" b="0" i="0" u="none" strike="noStrike" kern="1200" dirty="0" err="1">
+                <a:solidFill>
+                  <a:schemeClr val="tx1"/>
+                </a:solidFill>
+                <a:effectLst/>
+                <a:latin typeface="Arial" pitchFamily="34" charset="0"/>
+                <a:ea typeface="+mn-ea"/>
+                <a:cs typeface="Arial" pitchFamily="34" charset="0"/>
+              </a:rPr>
+              <a:t>applied</a:t>
+            </a:r>
+            <a:r>
+              <a:rPr lang="tr-TR" sz="1200" b="0" i="0" u="none" strike="noStrike" kern="1200" dirty="0">
+                <a:solidFill>
+                  <a:schemeClr val="tx1"/>
+                </a:solidFill>
+                <a:effectLst/>
+                <a:latin typeface="Arial" pitchFamily="34" charset="0"/>
+                <a:ea typeface="+mn-ea"/>
+                <a:cs typeface="Arial" pitchFamily="34" charset="0"/>
+              </a:rPr>
+              <a:t> </a:t>
+            </a:r>
+            <a:r>
+              <a:rPr lang="tr-TR" sz="1200" b="0" i="0" u="none" strike="noStrike" kern="1200" dirty="0" err="1">
+                <a:solidFill>
+                  <a:schemeClr val="tx1"/>
+                </a:solidFill>
+                <a:effectLst/>
+                <a:latin typeface="Arial" pitchFamily="34" charset="0"/>
+                <a:ea typeface="+mn-ea"/>
+                <a:cs typeface="Arial" pitchFamily="34" charset="0"/>
+              </a:rPr>
+              <a:t>to</a:t>
+            </a:r>
+            <a:r>
+              <a:rPr lang="tr-TR" sz="1200" b="0" i="0" u="none" strike="noStrike" kern="1200" dirty="0">
+                <a:solidFill>
+                  <a:schemeClr val="tx1"/>
+                </a:solidFill>
+                <a:effectLst/>
+                <a:latin typeface="Arial" pitchFamily="34" charset="0"/>
+                <a:ea typeface="+mn-ea"/>
+                <a:cs typeface="Arial" pitchFamily="34" charset="0"/>
+              </a:rPr>
+              <a:t> </a:t>
+            </a:r>
+            <a:r>
+              <a:rPr lang="tr-TR" sz="1200" b="0" i="0" u="none" strike="noStrike" kern="1200" dirty="0" err="1">
+                <a:solidFill>
+                  <a:schemeClr val="tx1"/>
+                </a:solidFill>
+                <a:effectLst/>
+                <a:latin typeface="Arial" pitchFamily="34" charset="0"/>
+                <a:ea typeface="+mn-ea"/>
+                <a:cs typeface="Arial" pitchFamily="34" charset="0"/>
+              </a:rPr>
+              <a:t>generalize</a:t>
+            </a:r>
+            <a:r>
+              <a:rPr lang="tr-TR" sz="1200" b="0" i="0" u="none" strike="noStrike" kern="1200" dirty="0">
+                <a:solidFill>
+                  <a:schemeClr val="tx1"/>
+                </a:solidFill>
+                <a:effectLst/>
+                <a:latin typeface="Arial" pitchFamily="34" charset="0"/>
+                <a:ea typeface="+mn-ea"/>
+                <a:cs typeface="Arial" pitchFamily="34" charset="0"/>
+              </a:rPr>
+              <a:t> </a:t>
+            </a:r>
+            <a:r>
+              <a:rPr lang="tr-TR" sz="1200" b="0" i="0" u="none" strike="noStrike" kern="1200" dirty="0" err="1">
+                <a:solidFill>
+                  <a:schemeClr val="tx1"/>
+                </a:solidFill>
+                <a:effectLst/>
+                <a:latin typeface="Arial" pitchFamily="34" charset="0"/>
+                <a:ea typeface="+mn-ea"/>
+                <a:cs typeface="Arial" pitchFamily="34" charset="0"/>
+              </a:rPr>
+              <a:t>the</a:t>
+            </a:r>
+            <a:r>
+              <a:rPr lang="tr-TR" sz="1200" b="0" i="0" u="none" strike="noStrike" kern="1200" dirty="0">
+                <a:solidFill>
+                  <a:schemeClr val="tx1"/>
+                </a:solidFill>
+                <a:effectLst/>
+                <a:latin typeface="Arial" pitchFamily="34" charset="0"/>
+                <a:ea typeface="+mn-ea"/>
+                <a:cs typeface="Arial" pitchFamily="34" charset="0"/>
+              </a:rPr>
+              <a:t> </a:t>
+            </a:r>
+            <a:r>
+              <a:rPr lang="tr-TR" sz="1200" b="0" i="0" u="none" strike="noStrike" kern="1200" dirty="0" err="1">
+                <a:solidFill>
+                  <a:schemeClr val="tx1"/>
+                </a:solidFill>
+                <a:effectLst/>
+                <a:latin typeface="Arial" pitchFamily="34" charset="0"/>
+                <a:ea typeface="+mn-ea"/>
+                <a:cs typeface="Arial" pitchFamily="34" charset="0"/>
+              </a:rPr>
+              <a:t>policy</a:t>
+            </a:r>
+            <a:r>
+              <a:rPr lang="tr-TR" sz="1200" b="0" i="0" u="none" strike="noStrike" kern="1200" dirty="0">
+                <a:solidFill>
+                  <a:schemeClr val="tx1"/>
+                </a:solidFill>
+                <a:effectLst/>
+                <a:latin typeface="Arial" pitchFamily="34" charset="0"/>
+                <a:ea typeface="+mn-ea"/>
+                <a:cs typeface="Arial" pitchFamily="34" charset="0"/>
+              </a:rPr>
+              <a:t> </a:t>
+            </a:r>
+            <a:r>
+              <a:rPr lang="tr-TR" sz="1200" b="0" i="0" u="none" strike="noStrike" kern="1200" dirty="0" err="1">
+                <a:solidFill>
+                  <a:schemeClr val="tx1"/>
+                </a:solidFill>
+                <a:effectLst/>
+                <a:latin typeface="Arial" pitchFamily="34" charset="0"/>
+                <a:ea typeface="+mn-ea"/>
+                <a:cs typeface="Arial" pitchFamily="34" charset="0"/>
+              </a:rPr>
+              <a:t>during</a:t>
+            </a:r>
+            <a:r>
+              <a:rPr lang="tr-TR" sz="1200" b="0" i="0" u="none" strike="noStrike" kern="1200" dirty="0">
+                <a:solidFill>
+                  <a:schemeClr val="tx1"/>
+                </a:solidFill>
+                <a:effectLst/>
+                <a:latin typeface="Arial" pitchFamily="34" charset="0"/>
+                <a:ea typeface="+mn-ea"/>
+                <a:cs typeface="Arial" pitchFamily="34" charset="0"/>
+              </a:rPr>
+              <a:t> </a:t>
+            </a:r>
+            <a:r>
+              <a:rPr lang="tr-TR" sz="1200" b="0" i="0" u="none" strike="noStrike" kern="1200" dirty="0" err="1">
+                <a:solidFill>
+                  <a:schemeClr val="tx1"/>
+                </a:solidFill>
+                <a:effectLst/>
+                <a:latin typeface="Arial" pitchFamily="34" charset="0"/>
+                <a:ea typeface="+mn-ea"/>
+                <a:cs typeface="Arial" pitchFamily="34" charset="0"/>
+              </a:rPr>
+              <a:t>traning</a:t>
+            </a:r>
+            <a:r>
+              <a:rPr lang="tr-TR" sz="1200" b="0" i="0" u="none" strike="noStrike" kern="1200" dirty="0">
+                <a:solidFill>
+                  <a:schemeClr val="tx1"/>
+                </a:solidFill>
+                <a:effectLst/>
+                <a:latin typeface="Arial" pitchFamily="34" charset="0"/>
+                <a:ea typeface="+mn-ea"/>
+                <a:cs typeface="Arial" pitchFamily="34" charset="0"/>
+              </a:rPr>
+              <a:t>. </a:t>
+            </a:r>
+            <a:r>
+              <a:rPr lang="tr-TR" sz="1200" b="0" i="0" u="none" strike="noStrike" kern="1200" dirty="0" err="1">
+                <a:solidFill>
+                  <a:schemeClr val="tx1"/>
+                </a:solidFill>
+                <a:effectLst/>
+                <a:latin typeface="Arial" pitchFamily="34" charset="0"/>
+                <a:ea typeface="+mn-ea"/>
+                <a:cs typeface="Arial" pitchFamily="34" charset="0"/>
+              </a:rPr>
+              <a:t>We</a:t>
+            </a:r>
+            <a:r>
+              <a:rPr lang="tr-TR" sz="1200" b="0" i="0" u="none" strike="noStrike" kern="1200" dirty="0">
+                <a:solidFill>
+                  <a:schemeClr val="tx1"/>
+                </a:solidFill>
+                <a:effectLst/>
+                <a:latin typeface="Arial" pitchFamily="34" charset="0"/>
+                <a:ea typeface="+mn-ea"/>
+                <a:cs typeface="Arial" pitchFamily="34" charset="0"/>
+              </a:rPr>
+              <a:t> </a:t>
+            </a:r>
+            <a:r>
+              <a:rPr lang="tr-TR" sz="1200" b="0" i="0" u="none" strike="noStrike" kern="1200" dirty="0" err="1">
+                <a:solidFill>
+                  <a:schemeClr val="tx1"/>
+                </a:solidFill>
+                <a:effectLst/>
+                <a:latin typeface="Arial" pitchFamily="34" charset="0"/>
+                <a:ea typeface="+mn-ea"/>
+                <a:cs typeface="Arial" pitchFamily="34" charset="0"/>
+              </a:rPr>
+              <a:t>created</a:t>
+            </a:r>
+            <a:r>
+              <a:rPr lang="tr-TR" sz="1200" b="0" i="0" u="none" strike="noStrike" kern="1200" dirty="0">
+                <a:solidFill>
+                  <a:schemeClr val="tx1"/>
+                </a:solidFill>
+                <a:effectLst/>
+                <a:latin typeface="Arial" pitchFamily="34" charset="0"/>
+                <a:ea typeface="+mn-ea"/>
+                <a:cs typeface="Arial" pitchFamily="34" charset="0"/>
+              </a:rPr>
+              <a:t> 6 </a:t>
+            </a:r>
+            <a:r>
+              <a:rPr lang="tr-TR" sz="1200" b="0" i="0" u="none" strike="noStrike" kern="1200" dirty="0" err="1">
+                <a:solidFill>
+                  <a:schemeClr val="tx1"/>
+                </a:solidFill>
+                <a:effectLst/>
+                <a:latin typeface="Arial" pitchFamily="34" charset="0"/>
+                <a:ea typeface="+mn-ea"/>
+                <a:cs typeface="Arial" pitchFamily="34" charset="0"/>
+              </a:rPr>
+              <a:t>different</a:t>
+            </a:r>
+            <a:r>
+              <a:rPr lang="tr-TR" sz="1200" b="0" i="0" u="none" strike="noStrike" kern="1200" dirty="0">
+                <a:solidFill>
+                  <a:schemeClr val="tx1"/>
+                </a:solidFill>
+                <a:effectLst/>
+                <a:latin typeface="Arial" pitchFamily="34" charset="0"/>
+                <a:ea typeface="+mn-ea"/>
+                <a:cs typeface="Arial" pitchFamily="34" charset="0"/>
+              </a:rPr>
+              <a:t> </a:t>
+            </a:r>
+            <a:r>
+              <a:rPr lang="tr-TR" sz="1200" b="0" i="0" u="none" strike="noStrike" kern="1200" dirty="0" err="1">
+                <a:solidFill>
+                  <a:schemeClr val="tx1"/>
+                </a:solidFill>
+                <a:effectLst/>
+                <a:latin typeface="Arial" pitchFamily="34" charset="0"/>
+                <a:ea typeface="+mn-ea"/>
+                <a:cs typeface="Arial" pitchFamily="34" charset="0"/>
+              </a:rPr>
+              <a:t>simulation</a:t>
+            </a:r>
+            <a:r>
+              <a:rPr lang="tr-TR" sz="1200" b="0" i="0" u="none" strike="noStrike" kern="1200" dirty="0">
+                <a:solidFill>
+                  <a:schemeClr val="tx1"/>
+                </a:solidFill>
+                <a:effectLst/>
+                <a:latin typeface="Arial" pitchFamily="34" charset="0"/>
+                <a:ea typeface="+mn-ea"/>
+                <a:cs typeface="Arial" pitchFamily="34" charset="0"/>
+              </a:rPr>
+              <a:t> </a:t>
+            </a:r>
+            <a:r>
+              <a:rPr lang="tr-TR" sz="1200" b="0" i="0" u="none" strike="noStrike" kern="1200" dirty="0" err="1">
+                <a:solidFill>
+                  <a:schemeClr val="tx1"/>
+                </a:solidFill>
+                <a:effectLst/>
+                <a:latin typeface="Arial" pitchFamily="34" charset="0"/>
+                <a:ea typeface="+mn-ea"/>
+                <a:cs typeface="Arial" pitchFamily="34" charset="0"/>
+              </a:rPr>
+              <a:t>environments</a:t>
+            </a:r>
+            <a:r>
+              <a:rPr lang="tr-TR" sz="1200" b="0" i="0" u="none" strike="noStrike" kern="1200" dirty="0">
+                <a:solidFill>
+                  <a:schemeClr val="tx1"/>
+                </a:solidFill>
+                <a:effectLst/>
+                <a:latin typeface="Arial" pitchFamily="34" charset="0"/>
+                <a:ea typeface="+mn-ea"/>
+                <a:cs typeface="Arial" pitchFamily="34" charset="0"/>
+              </a:rPr>
+              <a:t> </a:t>
+            </a:r>
+            <a:r>
+              <a:rPr lang="tr-TR" sz="1200" b="0" i="0" u="none" strike="noStrike" kern="1200" dirty="0" err="1">
+                <a:solidFill>
+                  <a:schemeClr val="tx1"/>
+                </a:solidFill>
+                <a:effectLst/>
+                <a:latin typeface="Arial" pitchFamily="34" charset="0"/>
+                <a:ea typeface="+mn-ea"/>
+                <a:cs typeface="Arial" pitchFamily="34" charset="0"/>
+              </a:rPr>
+              <a:t>with</a:t>
+            </a:r>
+            <a:r>
+              <a:rPr lang="tr-TR" sz="1200" b="0" i="0" u="none" strike="noStrike" kern="1200" dirty="0">
+                <a:solidFill>
+                  <a:schemeClr val="tx1"/>
+                </a:solidFill>
+                <a:effectLst/>
+                <a:latin typeface="Arial" pitchFamily="34" charset="0"/>
+                <a:ea typeface="+mn-ea"/>
+                <a:cs typeface="Arial" pitchFamily="34" charset="0"/>
+              </a:rPr>
+              <a:t> </a:t>
+            </a:r>
+            <a:r>
+              <a:rPr lang="tr-TR" sz="1200" b="0" i="0" u="none" strike="noStrike" kern="1200" dirty="0" err="1">
+                <a:solidFill>
+                  <a:schemeClr val="tx1"/>
+                </a:solidFill>
+                <a:effectLst/>
+                <a:latin typeface="Arial" pitchFamily="34" charset="0"/>
+                <a:ea typeface="+mn-ea"/>
+                <a:cs typeface="Arial" pitchFamily="34" charset="0"/>
+              </a:rPr>
+              <a:t>randomized</a:t>
+            </a:r>
+            <a:r>
+              <a:rPr lang="tr-TR" sz="1200" b="0" i="0" u="none" strike="noStrike" kern="1200" dirty="0">
+                <a:solidFill>
+                  <a:schemeClr val="tx1"/>
+                </a:solidFill>
+                <a:effectLst/>
+                <a:latin typeface="Arial" pitchFamily="34" charset="0"/>
+                <a:ea typeface="+mn-ea"/>
+                <a:cs typeface="Arial" pitchFamily="34" charset="0"/>
+              </a:rPr>
+              <a:t> </a:t>
+            </a:r>
+            <a:r>
+              <a:rPr lang="tr-TR" sz="1200" b="0" i="0" u="none" strike="noStrike" kern="1200" dirty="0" err="1">
+                <a:solidFill>
+                  <a:schemeClr val="tx1"/>
+                </a:solidFill>
+                <a:effectLst/>
+                <a:latin typeface="Arial" pitchFamily="34" charset="0"/>
+                <a:ea typeface="+mn-ea"/>
+                <a:cs typeface="Arial" pitchFamily="34" charset="0"/>
+              </a:rPr>
+              <a:t>properties</a:t>
+            </a:r>
+            <a:r>
+              <a:rPr lang="tr-TR" sz="1200" b="0" i="0" u="none" strike="noStrike" kern="1200" dirty="0">
+                <a:solidFill>
+                  <a:schemeClr val="tx1"/>
+                </a:solidFill>
+                <a:effectLst/>
+                <a:latin typeface="Arial" pitchFamily="34" charset="0"/>
+                <a:ea typeface="+mn-ea"/>
+                <a:cs typeface="Arial" pitchFamily="34" charset="0"/>
+              </a:rPr>
+              <a:t> </a:t>
+            </a:r>
+            <a:r>
+              <a:rPr lang="tr-TR" sz="1200" b="0" i="0" u="none" strike="noStrike" kern="1200" dirty="0" err="1">
+                <a:solidFill>
+                  <a:schemeClr val="tx1"/>
+                </a:solidFill>
+                <a:effectLst/>
+                <a:latin typeface="Arial" pitchFamily="34" charset="0"/>
+                <a:ea typeface="+mn-ea"/>
+                <a:cs typeface="Arial" pitchFamily="34" charset="0"/>
+              </a:rPr>
+              <a:t>and</a:t>
+            </a:r>
+            <a:r>
+              <a:rPr lang="tr-TR" sz="1200" b="0" i="0" u="none" strike="noStrike" kern="1200" dirty="0">
+                <a:solidFill>
+                  <a:schemeClr val="tx1"/>
+                </a:solidFill>
+                <a:effectLst/>
+                <a:latin typeface="Arial" pitchFamily="34" charset="0"/>
+                <a:ea typeface="+mn-ea"/>
+                <a:cs typeface="Arial" pitchFamily="34" charset="0"/>
+              </a:rPr>
+              <a:t> </a:t>
+            </a:r>
+            <a:r>
+              <a:rPr lang="tr-TR" sz="1200" b="0" i="0" u="none" strike="noStrike" kern="1200" dirty="0" err="1">
+                <a:solidFill>
+                  <a:schemeClr val="tx1"/>
+                </a:solidFill>
+                <a:effectLst/>
+                <a:latin typeface="Arial" pitchFamily="34" charset="0"/>
+                <a:ea typeface="+mn-ea"/>
+                <a:cs typeface="Arial" pitchFamily="34" charset="0"/>
+              </a:rPr>
+              <a:t>train</a:t>
+            </a:r>
+            <a:r>
+              <a:rPr lang="tr-TR" sz="1200" b="0" i="0" u="none" strike="noStrike" kern="1200" dirty="0">
+                <a:solidFill>
+                  <a:schemeClr val="tx1"/>
+                </a:solidFill>
+                <a:effectLst/>
+                <a:latin typeface="Arial" pitchFamily="34" charset="0"/>
+                <a:ea typeface="+mn-ea"/>
+                <a:cs typeface="Arial" pitchFamily="34" charset="0"/>
+              </a:rPr>
+              <a:t> a model </a:t>
+            </a:r>
+            <a:r>
+              <a:rPr lang="tr-TR" sz="1200" b="0" i="0" u="none" strike="noStrike" kern="1200" dirty="0" err="1">
+                <a:solidFill>
+                  <a:schemeClr val="tx1"/>
+                </a:solidFill>
+                <a:effectLst/>
+                <a:latin typeface="Arial" pitchFamily="34" charset="0"/>
+                <a:ea typeface="+mn-ea"/>
+                <a:cs typeface="Arial" pitchFamily="34" charset="0"/>
+              </a:rPr>
+              <a:t>that</a:t>
+            </a:r>
+            <a:r>
+              <a:rPr lang="tr-TR" sz="1200" b="0" i="0" u="none" strike="noStrike" kern="1200" dirty="0">
+                <a:solidFill>
+                  <a:schemeClr val="tx1"/>
+                </a:solidFill>
+                <a:effectLst/>
+                <a:latin typeface="Arial" pitchFamily="34" charset="0"/>
+                <a:ea typeface="+mn-ea"/>
+                <a:cs typeface="Arial" pitchFamily="34" charset="0"/>
+              </a:rPr>
+              <a:t> Works </a:t>
+            </a:r>
+            <a:r>
+              <a:rPr lang="tr-TR" sz="1200" b="0" i="0" u="none" strike="noStrike" kern="1200" dirty="0" err="1">
+                <a:solidFill>
+                  <a:schemeClr val="tx1"/>
+                </a:solidFill>
+                <a:effectLst/>
+                <a:latin typeface="Arial" pitchFamily="34" charset="0"/>
+                <a:ea typeface="+mn-ea"/>
+                <a:cs typeface="Arial" pitchFamily="34" charset="0"/>
+              </a:rPr>
+              <a:t>across</a:t>
+            </a:r>
+            <a:r>
+              <a:rPr lang="tr-TR" sz="1200" b="0" i="0" u="none" strike="noStrike" kern="1200" dirty="0">
+                <a:solidFill>
+                  <a:schemeClr val="tx1"/>
+                </a:solidFill>
+                <a:effectLst/>
+                <a:latin typeface="Arial" pitchFamily="34" charset="0"/>
+                <a:ea typeface="+mn-ea"/>
+                <a:cs typeface="Arial" pitchFamily="34" charset="0"/>
+              </a:rPr>
+              <a:t> </a:t>
+            </a:r>
+            <a:r>
+              <a:rPr lang="tr-TR" sz="1200" b="0" i="0" u="none" strike="noStrike" kern="1200" dirty="0" err="1">
+                <a:solidFill>
+                  <a:schemeClr val="tx1"/>
+                </a:solidFill>
+                <a:effectLst/>
+                <a:latin typeface="Arial" pitchFamily="34" charset="0"/>
+                <a:ea typeface="+mn-ea"/>
+                <a:cs typeface="Arial" pitchFamily="34" charset="0"/>
+              </a:rPr>
+              <a:t>all</a:t>
+            </a:r>
+            <a:r>
+              <a:rPr lang="tr-TR" sz="1200" b="0" i="0" u="none" strike="noStrike" kern="1200" dirty="0">
+                <a:solidFill>
+                  <a:schemeClr val="tx1"/>
+                </a:solidFill>
+                <a:effectLst/>
+                <a:latin typeface="Arial" pitchFamily="34" charset="0"/>
+                <a:ea typeface="+mn-ea"/>
+                <a:cs typeface="Arial" pitchFamily="34" charset="0"/>
+              </a:rPr>
+              <a:t> of </a:t>
+            </a:r>
+            <a:r>
+              <a:rPr lang="tr-TR" sz="1200" b="0" i="0" u="none" strike="noStrike" kern="1200" dirty="0" err="1">
+                <a:solidFill>
+                  <a:schemeClr val="tx1"/>
+                </a:solidFill>
+                <a:effectLst/>
+                <a:latin typeface="Arial" pitchFamily="34" charset="0"/>
+                <a:ea typeface="+mn-ea"/>
+                <a:cs typeface="Arial" pitchFamily="34" charset="0"/>
+              </a:rPr>
+              <a:t>them</a:t>
             </a:r>
             <a:r>
               <a:rPr lang="tr-TR" sz="1200" b="0" i="0" u="none" strike="noStrike" kern="1200" dirty="0">
@@ -10685,12 +11251,47 @@
           </a:p>
         </p:txBody>
       </p:sp>
+      <p:sp>
+        <p:nvSpPr>
+          <p:cNvPr id="57" name="Metin kutusu 56">
+            <a:extLst>
+              <a:ext uri="{FF2B5EF4-FFF2-40B4-BE49-F238E27FC236}">
+                <a16:creationId xmlns:a16="http://schemas.microsoft.com/office/drawing/2014/main" id="{A4385683-38F1-0642-9598-17BB46674748}"/>
+              </a:ext>
+            </a:extLst>
+          </p:cNvPr>
+          <p:cNvSpPr txBox="1"/>
+          <p:nvPr/>
+        </p:nvSpPr>
+        <p:spPr>
+          <a:xfrm>
+            <a:off x="5332759" y="4718186"/>
+            <a:ext cx="1913657" cy="420536"/>
+          </a:xfrm>
+          <a:prstGeom prst="rect">
+            <a:avLst/>
+          </a:prstGeom>
+          <a:noFill/>
+        </p:spPr>
+        <p:txBody>
+          <a:bodyPr wrap="none" rtlCol="0">
+            <a:spAutoFit/>
+          </a:bodyPr>
+          <a:lstStyle/>
+          <a:p>
+            <a:r>
+              <a:rPr lang="en-US" dirty="0"/>
+              <a:t>Action Space</a:t>
+            </a:r>
+          </a:p>
+        </p:txBody>
+      </p:sp>
       <p:grpSp>
         <p:nvGrpSpPr>
-          <p:cNvPr id="53" name="Grup 52">
+          <p:cNvPr id="61" name="Grup 60">
             <a:extLst>
               <a:ext uri="{FF2B5EF4-FFF2-40B4-BE49-F238E27FC236}">
-                <a16:creationId xmlns:a16="http://schemas.microsoft.com/office/drawing/2014/main" id="{92D60014-DA29-EC4F-AFF4-9F0EB72C39C3}"/>
+                <a16:creationId xmlns:a16="http://schemas.microsoft.com/office/drawing/2014/main" id="{48B970A8-A661-3E44-A059-22F519316199}"/>
               </a:ext>
             </a:extLst>
           </p:cNvPr>
@@ -10699,53 +11300,18 @@
         </p:nvGrpSpPr>
         <p:grpSpPr>
           <a:xfrm>
-            <a:off x="440874" y="2479877"/>
-            <a:ext cx="2867809" cy="3755002"/>
-            <a:chOff x="7752244" y="605291"/>
-            <a:chExt cx="2711545" cy="4397066"/>
+            <a:off x="279099" y="2847225"/>
+            <a:ext cx="2153158" cy="3154068"/>
+            <a:chOff x="8226595" y="2171554"/>
+            <a:chExt cx="2035835" cy="3693377"/>
           </a:xfrm>
         </p:grpSpPr>
-        <p:sp>
-          <p:nvSpPr>
-            <p:cNvPr id="57" name="Metin kutusu 56">
+        <p:grpSp>
+          <p:nvGrpSpPr>
+            <p:cNvPr id="62" name="Grup 61">
               <a:extLst>
                 <a:ext uri="{FF2B5EF4-FFF2-40B4-BE49-F238E27FC236}">
-                  <a16:creationId xmlns:a16="http://schemas.microsoft.com/office/drawing/2014/main" id="{A4385683-38F1-0642-9598-17BB46674748}"/>
-                </a:ext>
-              </a:extLst>
-            </p:cNvPr>
-            <p:cNvSpPr txBox="1"/>
-            <p:nvPr/>
-          </p:nvSpPr>
-          <p:spPr>
-            <a:xfrm>
-              <a:off x="8128813" y="3642680"/>
-              <a:ext cx="1809384" cy="492443"/>
-            </a:xfrm>
-            <a:prstGeom prst="rect">
-              <a:avLst/>
-            </a:prstGeom>
-            <a:noFill/>
-          </p:spPr>
-          <p:txBody>
-            <a:bodyPr wrap="none" rtlCol="0">
-              <a:spAutoFit/>
-            </a:bodyPr>
-            <a:lstStyle/>
-            <a:p>
-              <a:r>
-                <a:rPr lang="en-US" dirty="0"/>
-                <a:t>Action Space</a:t>
-              </a:r>
-            </a:p>
-          </p:txBody>
-        </p:sp>
-        <p:grpSp>
-          <p:nvGrpSpPr>
-            <p:cNvPr id="61" name="Grup 60">
-              <a:extLst>
-                <a:ext uri="{FF2B5EF4-FFF2-40B4-BE49-F238E27FC236}">
-                  <a16:creationId xmlns:a16="http://schemas.microsoft.com/office/drawing/2014/main" id="{48B970A8-A661-3E44-A059-22F519316199}"/>
+                  <a16:creationId xmlns:a16="http://schemas.microsoft.com/office/drawing/2014/main" id="{86CC7D44-6011-534B-89EE-889F0F8CCFFD}"/>
                 </a:ext>
               </a:extLst>
             </p:cNvPr>
@@ -10754,1034 +11320,1021 @@
           </p:nvGrpSpPr>
           <p:grpSpPr>
             <a:xfrm>
-              <a:off x="7752244" y="605291"/>
-              <a:ext cx="2711545" cy="4397066"/>
-              <a:chOff x="8227326" y="2171554"/>
-              <a:chExt cx="2711545" cy="4397066"/>
+              <a:off x="8226595" y="2171554"/>
+              <a:ext cx="2035835" cy="2931914"/>
+              <a:chOff x="8226595" y="2171554"/>
+              <a:chExt cx="2035835" cy="2931914"/>
             </a:xfrm>
           </p:grpSpPr>
-          <p:grpSp>
-            <p:nvGrpSpPr>
-              <p:cNvPr id="62" name="Grup 61">
+          <p:cxnSp>
+            <p:nvCxnSpPr>
+              <p:cNvPr id="68" name="Düz Ok Bağlayıcısı 67">
                 <a:extLst>
                   <a:ext uri="{FF2B5EF4-FFF2-40B4-BE49-F238E27FC236}">
-                    <a16:creationId xmlns:a16="http://schemas.microsoft.com/office/drawing/2014/main" id="{86CC7D44-6011-534B-89EE-889F0F8CCFFD}"/>
+                    <a16:creationId xmlns:a16="http://schemas.microsoft.com/office/drawing/2014/main" id="{9A45F54A-1688-A34C-B2BB-03C4606880D4}"/>
                   </a:ext>
                 </a:extLst>
               </p:cNvPr>
-              <p:cNvGrpSpPr/>
+              <p:cNvCxnSpPr/>
               <p:nvPr/>
-            </p:nvGrpSpPr>
-            <p:grpSpPr>
-              <a:xfrm>
-                <a:off x="8227326" y="2171554"/>
-                <a:ext cx="2106085" cy="2931915"/>
-                <a:chOff x="8227326" y="2171554"/>
-                <a:chExt cx="2106085" cy="2931915"/>
+            </p:nvCxnSpPr>
+            <p:spPr>
+              <a:xfrm flipV="1">
+                <a:off x="9300560" y="2436575"/>
+                <a:ext cx="0" cy="2185876"/>
               </a:xfrm>
-            </p:grpSpPr>
-            <p:cxnSp>
-              <p:nvCxnSpPr>
-                <p:cNvPr id="68" name="Düz Ok Bağlayıcısı 67">
-                  <a:extLst>
-                    <a:ext uri="{FF2B5EF4-FFF2-40B4-BE49-F238E27FC236}">
-                      <a16:creationId xmlns:a16="http://schemas.microsoft.com/office/drawing/2014/main" id="{9A45F54A-1688-A34C-B2BB-03C4606880D4}"/>
-                    </a:ext>
-                  </a:extLst>
-                </p:cNvPr>
-                <p:cNvCxnSpPr/>
-                <p:nvPr/>
-              </p:nvCxnSpPr>
-              <p:spPr>
-                <a:xfrm flipV="1">
-                  <a:off x="9300560" y="2436575"/>
-                  <a:ext cx="0" cy="2185876"/>
-                </a:xfrm>
-                <a:prstGeom prst="straightConnector1">
-                  <a:avLst/>
-                </a:prstGeom>
-                <a:ln w="25400">
-                  <a:solidFill>
-                    <a:schemeClr val="accent2"/>
-                  </a:solidFill>
-                  <a:tailEnd type="triangle"/>
-                </a:ln>
-              </p:spPr>
-              <p:style>
-                <a:lnRef idx="1">
-                  <a:schemeClr val="accent1"/>
-                </a:lnRef>
-                <a:fillRef idx="0">
-                  <a:schemeClr val="accent1"/>
-                </a:fillRef>
-                <a:effectRef idx="0">
-                  <a:schemeClr val="accent1"/>
-                </a:effectRef>
-                <a:fontRef idx="minor">
-                  <a:schemeClr val="tx1"/>
-                </a:fontRef>
-              </p:style>
-            </p:cxnSp>
-            <p:cxnSp>
-              <p:nvCxnSpPr>
-                <p:cNvPr id="69" name="Düz Ok Bağlayıcısı 68">
-                  <a:extLst>
-                    <a:ext uri="{FF2B5EF4-FFF2-40B4-BE49-F238E27FC236}">
-                      <a16:creationId xmlns:a16="http://schemas.microsoft.com/office/drawing/2014/main" id="{28E77484-7E3D-5F45-AB85-BF4205A10E24}"/>
-                    </a:ext>
-                  </a:extLst>
-                </p:cNvPr>
-                <p:cNvCxnSpPr/>
-                <p:nvPr/>
-              </p:nvCxnSpPr>
-              <p:spPr>
-                <a:xfrm flipV="1">
-                  <a:off x="9378709" y="2986763"/>
-                  <a:ext cx="16290" cy="1609519"/>
-                </a:xfrm>
-                <a:prstGeom prst="straightConnector1">
-                  <a:avLst/>
-                </a:prstGeom>
-                <a:ln w="25400">
-                  <a:solidFill>
-                    <a:schemeClr val="accent2"/>
-                  </a:solidFill>
-                  <a:tailEnd type="triangle"/>
-                </a:ln>
-              </p:spPr>
-              <p:style>
-                <a:lnRef idx="1">
-                  <a:schemeClr val="accent1"/>
-                </a:lnRef>
-                <a:fillRef idx="0">
-                  <a:schemeClr val="accent1"/>
-                </a:fillRef>
-                <a:effectRef idx="0">
-                  <a:schemeClr val="accent1"/>
-                </a:effectRef>
-                <a:fontRef idx="minor">
-                  <a:schemeClr val="tx1"/>
-                </a:fontRef>
-              </p:style>
-            </p:cxnSp>
-            <p:sp>
-              <p:nvSpPr>
-                <p:cNvPr id="70" name="Veya 69">
-                  <a:extLst>
-                    <a:ext uri="{FF2B5EF4-FFF2-40B4-BE49-F238E27FC236}">
-                      <a16:creationId xmlns:a16="http://schemas.microsoft.com/office/drawing/2014/main" id="{2532DA8D-F133-CC4C-8048-61BA9D48FFA1}"/>
-                    </a:ext>
-                  </a:extLst>
-                </p:cNvPr>
-                <p:cNvSpPr/>
-                <p:nvPr/>
-              </p:nvSpPr>
-              <p:spPr>
-                <a:xfrm>
-                  <a:off x="8792404" y="4141433"/>
-                  <a:ext cx="1016312" cy="962036"/>
-                </a:xfrm>
-                <a:prstGeom prst="flowChartOr">
-                  <a:avLst/>
-                </a:prstGeom>
-                <a:ln w="22225">
-                  <a:solidFill>
-                    <a:schemeClr val="accent1">
-                      <a:shade val="50000"/>
-                      <a:alpha val="86000"/>
-                    </a:schemeClr>
-                  </a:solidFill>
-                </a:ln>
-              </p:spPr>
-              <p:style>
-                <a:lnRef idx="2">
-                  <a:schemeClr val="accent1">
-                    <a:shade val="50000"/>
-                  </a:schemeClr>
-                </a:lnRef>
-                <a:fillRef idx="1">
-                  <a:schemeClr val="accent1"/>
-                </a:fillRef>
-                <a:effectRef idx="0">
-                  <a:schemeClr val="accent1"/>
-                </a:effectRef>
-                <a:fontRef idx="minor">
-                  <a:schemeClr val="lt1"/>
-                </a:fontRef>
-              </p:style>
-              <p:txBody>
-                <a:bodyPr rtlCol="0" anchor="ctr"/>
-                <a:lstStyle/>
-                <a:p>
-                  <a:pPr algn="ctr"/>
-                  <a:endParaRPr lang="en-US" dirty="0">
-                    <a:solidFill>
-                      <a:srgbClr val="92D050"/>
-                    </a:solidFill>
-                  </a:endParaRPr>
-                </a:p>
-              </p:txBody>
-            </p:sp>
-            <p:sp>
-              <p:nvSpPr>
-                <p:cNvPr id="71" name="Metin kutusu 70">
-                  <a:extLst>
-                    <a:ext uri="{FF2B5EF4-FFF2-40B4-BE49-F238E27FC236}">
-                      <a16:creationId xmlns:a16="http://schemas.microsoft.com/office/drawing/2014/main" id="{6E1AB2DC-7A32-8B48-9CF6-9E9F626B2EFA}"/>
-                    </a:ext>
-                  </a:extLst>
-                </p:cNvPr>
-                <p:cNvSpPr txBox="1"/>
-                <p:nvPr/>
-              </p:nvSpPr>
-              <p:spPr>
-                <a:xfrm>
-                  <a:off x="8817680" y="2171554"/>
-                  <a:ext cx="689791" cy="338555"/>
-                </a:xfrm>
-                <a:prstGeom prst="rect">
-                  <a:avLst/>
-                </a:prstGeom>
-                <a:noFill/>
-              </p:spPr>
-              <p:txBody>
-                <a:bodyPr wrap="none" rtlCol="0">
-                  <a:spAutoFit/>
-                </a:bodyPr>
-                <a:lstStyle/>
-                <a:p>
-                  <a:r>
-                    <a:rPr lang="en-US" sz="1050" dirty="0"/>
-                    <a:t>0.4m/s</a:t>
-                  </a:r>
-                </a:p>
-              </p:txBody>
-            </p:sp>
-            <p:sp>
-              <p:nvSpPr>
-                <p:cNvPr id="72" name="Metin kutusu 71">
-                  <a:extLst>
-                    <a:ext uri="{FF2B5EF4-FFF2-40B4-BE49-F238E27FC236}">
-                      <a16:creationId xmlns:a16="http://schemas.microsoft.com/office/drawing/2014/main" id="{826074EC-B482-7341-A7C8-6F50EA82CF53}"/>
-                    </a:ext>
-                  </a:extLst>
-                </p:cNvPr>
-                <p:cNvSpPr txBox="1"/>
-                <p:nvPr/>
-              </p:nvSpPr>
-              <p:spPr>
-                <a:xfrm>
-                  <a:off x="9283929" y="2696482"/>
-                  <a:ext cx="689791" cy="338555"/>
-                </a:xfrm>
-                <a:prstGeom prst="rect">
-                  <a:avLst/>
-                </a:prstGeom>
-                <a:noFill/>
-              </p:spPr>
-              <p:txBody>
-                <a:bodyPr wrap="none" rtlCol="0">
-                  <a:spAutoFit/>
-                </a:bodyPr>
-                <a:lstStyle/>
-                <a:p>
-                  <a:r>
-                    <a:rPr lang="en-US" sz="1050" dirty="0"/>
-                    <a:t>0.2m/s</a:t>
-                  </a:r>
-                </a:p>
-              </p:txBody>
-            </p:sp>
-            <p:cxnSp>
-              <p:nvCxnSpPr>
-                <p:cNvPr id="73" name="Düz Bağlayıcı 72">
-                  <a:extLst>
-                    <a:ext uri="{FF2B5EF4-FFF2-40B4-BE49-F238E27FC236}">
-                      <a16:creationId xmlns:a16="http://schemas.microsoft.com/office/drawing/2014/main" id="{C7D19379-38F8-A343-90E1-34B0AB082166}"/>
-                    </a:ext>
-                  </a:extLst>
-                </p:cNvPr>
-                <p:cNvCxnSpPr/>
-                <p:nvPr/>
-              </p:nvCxnSpPr>
-              <p:spPr>
-                <a:xfrm flipH="1" flipV="1">
-                  <a:off x="9000646" y="3411313"/>
-                  <a:ext cx="283283" cy="1193082"/>
-                </a:xfrm>
-                <a:prstGeom prst="line">
-                  <a:avLst/>
-                </a:prstGeom>
-                <a:ln w="31750">
-                  <a:solidFill>
-                    <a:schemeClr val="accent6"/>
-                  </a:solidFill>
-                  <a:prstDash val="sysDot"/>
-                </a:ln>
-              </p:spPr>
-              <p:style>
-                <a:lnRef idx="1">
-                  <a:schemeClr val="accent1"/>
-                </a:lnRef>
-                <a:fillRef idx="0">
-                  <a:schemeClr val="accent1"/>
-                </a:fillRef>
-                <a:effectRef idx="0">
-                  <a:schemeClr val="accent1"/>
-                </a:effectRef>
-                <a:fontRef idx="minor">
-                  <a:schemeClr val="tx1"/>
-                </a:fontRef>
-              </p:style>
-            </p:cxnSp>
-            <p:cxnSp>
-              <p:nvCxnSpPr>
-                <p:cNvPr id="74" name="Düz Bağlayıcı 73">
-                  <a:extLst>
-                    <a:ext uri="{FF2B5EF4-FFF2-40B4-BE49-F238E27FC236}">
-                      <a16:creationId xmlns:a16="http://schemas.microsoft.com/office/drawing/2014/main" id="{13AC7879-5785-1347-B4DC-724EF603AD4D}"/>
-                    </a:ext>
-                  </a:extLst>
-                </p:cNvPr>
-                <p:cNvCxnSpPr/>
-                <p:nvPr/>
-              </p:nvCxnSpPr>
-              <p:spPr>
-                <a:xfrm flipH="1" flipV="1">
-                  <a:off x="8672404" y="3518402"/>
-                  <a:ext cx="611526" cy="1104050"/>
-                </a:xfrm>
-                <a:prstGeom prst="line">
-                  <a:avLst/>
-                </a:prstGeom>
-                <a:ln w="31750">
-                  <a:solidFill>
-                    <a:schemeClr val="accent6"/>
-                  </a:solidFill>
-                  <a:prstDash val="sysDot"/>
-                </a:ln>
-              </p:spPr>
-              <p:style>
-                <a:lnRef idx="1">
-                  <a:schemeClr val="accent1"/>
-                </a:lnRef>
-                <a:fillRef idx="0">
-                  <a:schemeClr val="accent1"/>
-                </a:fillRef>
-                <a:effectRef idx="0">
-                  <a:schemeClr val="accent1"/>
-                </a:effectRef>
-                <a:fontRef idx="minor">
-                  <a:schemeClr val="tx1"/>
-                </a:fontRef>
-              </p:style>
-            </p:cxnSp>
-            <p:cxnSp>
-              <p:nvCxnSpPr>
-                <p:cNvPr id="75" name="Düz Bağlayıcı 74">
-                  <a:extLst>
-                    <a:ext uri="{FF2B5EF4-FFF2-40B4-BE49-F238E27FC236}">
-                      <a16:creationId xmlns:a16="http://schemas.microsoft.com/office/drawing/2014/main" id="{84FE772B-9AC2-014B-8C8E-846C0C068B40}"/>
-                    </a:ext>
-                  </a:extLst>
-                </p:cNvPr>
-                <p:cNvCxnSpPr/>
-                <p:nvPr/>
-              </p:nvCxnSpPr>
-              <p:spPr>
-                <a:xfrm flipV="1">
-                  <a:off x="9317192" y="3376437"/>
-                  <a:ext cx="240696" cy="1234556"/>
-                </a:xfrm>
-                <a:prstGeom prst="line">
-                  <a:avLst/>
-                </a:prstGeom>
-                <a:ln w="31750">
-                  <a:solidFill>
-                    <a:schemeClr val="accent6"/>
-                  </a:solidFill>
-                  <a:prstDash val="sysDot"/>
-                </a:ln>
-              </p:spPr>
-              <p:style>
-                <a:lnRef idx="1">
-                  <a:schemeClr val="accent1"/>
-                </a:lnRef>
-                <a:fillRef idx="0">
-                  <a:schemeClr val="accent1"/>
-                </a:fillRef>
-                <a:effectRef idx="0">
-                  <a:schemeClr val="accent1"/>
-                </a:effectRef>
-                <a:fontRef idx="minor">
-                  <a:schemeClr val="tx1"/>
-                </a:fontRef>
-              </p:style>
-            </p:cxnSp>
-            <p:cxnSp>
-              <p:nvCxnSpPr>
-                <p:cNvPr id="76" name="Düz Bağlayıcı 75">
-                  <a:extLst>
-                    <a:ext uri="{FF2B5EF4-FFF2-40B4-BE49-F238E27FC236}">
-                      <a16:creationId xmlns:a16="http://schemas.microsoft.com/office/drawing/2014/main" id="{40BD3E9E-A4FB-5443-A820-E640AD791E00}"/>
-                    </a:ext>
-                  </a:extLst>
-                </p:cNvPr>
-                <p:cNvCxnSpPr>
-                  <a:endCxn id="80" idx="1"/>
-                </p:cNvCxnSpPr>
-                <p:nvPr/>
-              </p:nvCxnSpPr>
-              <p:spPr>
-                <a:xfrm flipV="1">
-                  <a:off x="9317192" y="3449734"/>
-                  <a:ext cx="537648" cy="1161261"/>
-                </a:xfrm>
-                <a:prstGeom prst="line">
-                  <a:avLst/>
-                </a:prstGeom>
-                <a:ln w="31750">
-                  <a:solidFill>
-                    <a:schemeClr val="accent6"/>
-                  </a:solidFill>
-                  <a:prstDash val="sysDot"/>
-                </a:ln>
-              </p:spPr>
-              <p:style>
-                <a:lnRef idx="1">
-                  <a:schemeClr val="accent1"/>
-                </a:lnRef>
-                <a:fillRef idx="0">
-                  <a:schemeClr val="accent1"/>
-                </a:fillRef>
-                <a:effectRef idx="0">
-                  <a:schemeClr val="accent1"/>
-                </a:effectRef>
-                <a:fontRef idx="minor">
-                  <a:schemeClr val="tx1"/>
-                </a:fontRef>
-              </p:style>
-            </p:cxnSp>
-            <mc:AlternateContent xmlns:mc="http://schemas.openxmlformats.org/markup-compatibility/2006">
-              <mc:Choice xmlns:a14="http://schemas.microsoft.com/office/drawing/2010/main" Requires="a14">
-                <p:sp>
-                  <p:nvSpPr>
-                    <p:cNvPr id="77" name="Metin kutusu 76">
-                      <a:extLst>
-                        <a:ext uri="{FF2B5EF4-FFF2-40B4-BE49-F238E27FC236}">
-                          <a16:creationId xmlns:a16="http://schemas.microsoft.com/office/drawing/2014/main" id="{3BA81818-DBD5-604F-805B-1BFBB4F4618A}"/>
-                        </a:ext>
-                      </a:extLst>
-                    </p:cNvPr>
-                    <p:cNvSpPr txBox="1"/>
-                    <p:nvPr/>
-                  </p:nvSpPr>
-                  <p:spPr>
-                    <a:xfrm>
-                      <a:off x="8592433" y="3103234"/>
-                      <a:ext cx="655151" cy="307776"/>
-                    </a:xfrm>
-                    <a:prstGeom prst="rect">
-                      <a:avLst/>
-                    </a:prstGeom>
-                    <a:noFill/>
-                  </p:spPr>
-                  <p:txBody>
-                    <a:bodyPr wrap="none" rtlCol="0">
-                      <a:spAutoFit/>
-                    </a:bodyPr>
-                    <a:lstStyle/>
-                    <a:p>
-                      <a:pPr/>
-                      <a14:m>
-                        <m:oMathPara xmlns:m="http://schemas.openxmlformats.org/officeDocument/2006/math">
-                          <m:oMathParaPr>
-                            <m:jc m:val="centerGroup"/>
-                          </m:oMathParaPr>
-                          <m:oMath xmlns:m="http://schemas.openxmlformats.org/officeDocument/2006/math">
-                            <m:r>
-                              <a:rPr lang="tr-TR" sz="900" i="1">
-                                <a:latin typeface="Cambria Math" charset="0"/>
-                                <a:ea typeface="Cambria Math" charset="0"/>
-                                <a:cs typeface="Cambria Math" charset="0"/>
-                              </a:rPr>
-                              <m:t>−</m:t>
-                            </m:r>
-                            <m:r>
-                              <a:rPr lang="en-US" sz="900" i="1">
-                                <a:latin typeface="Cambria Math" charset="0"/>
-                                <a:ea typeface="Cambria Math" charset="0"/>
-                                <a:cs typeface="Cambria Math" charset="0"/>
-                              </a:rPr>
-                              <m:t>𝜋</m:t>
-                            </m:r>
-                            <m:r>
-                              <a:rPr lang="tr-TR" sz="900" i="1">
-                                <a:latin typeface="Cambria Math" charset="0"/>
-                                <a:ea typeface="Cambria Math" charset="0"/>
-                                <a:cs typeface="Cambria Math" charset="0"/>
-                              </a:rPr>
-                              <m:t>/12</m:t>
-                            </m:r>
-                          </m:oMath>
-                        </m:oMathPara>
-                      </a14:m>
-                      <a:endParaRPr lang="en-US" dirty="0"/>
-                    </a:p>
-                  </p:txBody>
-                </p:sp>
-              </mc:Choice>
-              <mc:Fallback>
-                <p:sp>
-                  <p:nvSpPr>
-                    <p:cNvPr id="77" name="Metin kutusu 76">
-                      <a:extLst>
-                        <a:ext uri="{FF2B5EF4-FFF2-40B4-BE49-F238E27FC236}">
-                          <a16:creationId xmlns:a16="http://schemas.microsoft.com/office/drawing/2014/main" id="{3BA81818-DBD5-604F-805B-1BFBB4F4618A}"/>
-                        </a:ext>
-                      </a:extLst>
-                    </p:cNvPr>
-                    <p:cNvSpPr txBox="1">
-                      <a:spLocks noRot="1" noChangeAspect="1" noMove="1" noResize="1" noEditPoints="1" noAdjustHandles="1" noChangeArrowheads="1" noChangeShapeType="1" noTextEdit="1"/>
-                    </p:cNvSpPr>
-                    <p:nvPr/>
-                  </p:nvSpPr>
-                  <p:spPr>
-                    <a:xfrm>
-                      <a:off x="8592433" y="3103234"/>
-                      <a:ext cx="655151" cy="307776"/>
-                    </a:xfrm>
-                    <a:prstGeom prst="rect">
-                      <a:avLst/>
-                    </a:prstGeom>
-                    <a:blipFill>
-                      <a:blip r:embed="rId3"/>
-                      <a:stretch>
-                        <a:fillRect/>
-                      </a:stretch>
-                    </a:blipFill>
-                  </p:spPr>
-                  <p:txBody>
-                    <a:bodyPr/>
-                    <a:lstStyle/>
-                    <a:p>
-                      <a:r>
-                        <a:rPr lang="en-US">
-                          <a:noFill/>
-                        </a:rPr>
-                        <a:t> </a:t>
-                      </a:r>
-                    </a:p>
-                  </p:txBody>
-                </p:sp>
-              </mc:Fallback>
-            </mc:AlternateContent>
-            <mc:AlternateContent xmlns:mc="http://schemas.openxmlformats.org/markup-compatibility/2006">
-              <mc:Choice xmlns:a14="http://schemas.microsoft.com/office/drawing/2010/main" Requires="a14">
-                <p:sp>
-                  <p:nvSpPr>
-                    <p:cNvPr id="78" name="Metin kutusu 77">
-                      <a:extLst>
-                        <a:ext uri="{FF2B5EF4-FFF2-40B4-BE49-F238E27FC236}">
-                          <a16:creationId xmlns:a16="http://schemas.microsoft.com/office/drawing/2014/main" id="{D110CBC8-F97F-BC47-B9D0-06B3EFE73697}"/>
-                        </a:ext>
-                      </a:extLst>
-                    </p:cNvPr>
-                    <p:cNvSpPr txBox="1"/>
-                    <p:nvPr/>
-                  </p:nvSpPr>
-                  <p:spPr>
-                    <a:xfrm>
-                      <a:off x="8227326" y="3555878"/>
-                      <a:ext cx="580011" cy="307776"/>
-                    </a:xfrm>
-                    <a:prstGeom prst="rect">
-                      <a:avLst/>
-                    </a:prstGeom>
-                    <a:noFill/>
-                  </p:spPr>
-                  <p:txBody>
-                    <a:bodyPr wrap="none" rtlCol="0">
-                      <a:spAutoFit/>
-                    </a:bodyPr>
-                    <a:lstStyle/>
-                    <a:p>
-                      <a:pPr/>
-                      <a14:m>
-                        <m:oMathPara xmlns:m="http://schemas.openxmlformats.org/officeDocument/2006/math">
-                          <m:oMathParaPr>
-                            <m:jc m:val="centerGroup"/>
-                          </m:oMathParaPr>
-                          <m:oMath xmlns:m="http://schemas.openxmlformats.org/officeDocument/2006/math">
-                            <m:r>
-                              <a:rPr lang="tr-TR" sz="900" i="1">
-                                <a:latin typeface="Cambria Math" charset="0"/>
-                                <a:ea typeface="Cambria Math" charset="0"/>
-                                <a:cs typeface="Cambria Math" charset="0"/>
-                              </a:rPr>
-                              <m:t>−</m:t>
-                            </m:r>
-                            <m:r>
-                              <a:rPr lang="en-US" sz="900" i="1">
-                                <a:latin typeface="Cambria Math" charset="0"/>
-                                <a:ea typeface="Cambria Math" charset="0"/>
-                                <a:cs typeface="Cambria Math" charset="0"/>
-                              </a:rPr>
-                              <m:t>𝜋</m:t>
-                            </m:r>
-                            <m:r>
-                              <a:rPr lang="tr-TR" sz="900" i="1">
-                                <a:latin typeface="Cambria Math" charset="0"/>
-                                <a:ea typeface="Cambria Math" charset="0"/>
-                                <a:cs typeface="Cambria Math" charset="0"/>
-                              </a:rPr>
-                              <m:t>/6</m:t>
-                            </m:r>
-                          </m:oMath>
-                        </m:oMathPara>
-                      </a14:m>
-                      <a:endParaRPr lang="en-US" dirty="0"/>
-                    </a:p>
-                  </p:txBody>
-                </p:sp>
-              </mc:Choice>
-              <mc:Fallback>
-                <p:sp>
-                  <p:nvSpPr>
-                    <p:cNvPr id="78" name="Metin kutusu 77">
-                      <a:extLst>
-                        <a:ext uri="{FF2B5EF4-FFF2-40B4-BE49-F238E27FC236}">
-                          <a16:creationId xmlns:a16="http://schemas.microsoft.com/office/drawing/2014/main" id="{D110CBC8-F97F-BC47-B9D0-06B3EFE73697}"/>
-                        </a:ext>
-                      </a:extLst>
-                    </p:cNvPr>
-                    <p:cNvSpPr txBox="1">
-                      <a:spLocks noRot="1" noChangeAspect="1" noMove="1" noResize="1" noEditPoints="1" noAdjustHandles="1" noChangeArrowheads="1" noChangeShapeType="1" noTextEdit="1"/>
-                    </p:cNvSpPr>
-                    <p:nvPr/>
-                  </p:nvSpPr>
-                  <p:spPr>
-                    <a:xfrm>
-                      <a:off x="8227326" y="3555878"/>
-                      <a:ext cx="580011" cy="307776"/>
-                    </a:xfrm>
-                    <a:prstGeom prst="rect">
-                      <a:avLst/>
-                    </a:prstGeom>
-                    <a:blipFill>
-                      <a:blip r:embed="rId4"/>
-                      <a:stretch>
-                        <a:fillRect/>
-                      </a:stretch>
-                    </a:blipFill>
-                  </p:spPr>
-                  <p:txBody>
-                    <a:bodyPr/>
-                    <a:lstStyle/>
-                    <a:p>
-                      <a:r>
-                        <a:rPr lang="en-US">
-                          <a:noFill/>
-                        </a:rPr>
-                        <a:t> </a:t>
-                      </a:r>
-                    </a:p>
-                  </p:txBody>
-                </p:sp>
-              </mc:Fallback>
-            </mc:AlternateContent>
-            <mc:AlternateContent xmlns:mc="http://schemas.openxmlformats.org/markup-compatibility/2006">
-              <mc:Choice xmlns:a14="http://schemas.microsoft.com/office/drawing/2010/main" Requires="a14">
-                <p:sp>
-                  <p:nvSpPr>
-                    <p:cNvPr id="79" name="Metin kutusu 78">
-                      <a:extLst>
-                        <a:ext uri="{FF2B5EF4-FFF2-40B4-BE49-F238E27FC236}">
-                          <a16:creationId xmlns:a16="http://schemas.microsoft.com/office/drawing/2014/main" id="{5868C204-9BF4-2847-A60A-269AE49CD6FC}"/>
-                        </a:ext>
-                      </a:extLst>
-                    </p:cNvPr>
-                    <p:cNvSpPr txBox="1"/>
-                    <p:nvPr/>
-                  </p:nvSpPr>
-                  <p:spPr>
-                    <a:xfrm>
-                      <a:off x="9411219" y="3122831"/>
-                      <a:ext cx="553712" cy="307776"/>
-                    </a:xfrm>
-                    <a:prstGeom prst="rect">
-                      <a:avLst/>
-                    </a:prstGeom>
-                    <a:noFill/>
-                  </p:spPr>
-                  <p:txBody>
-                    <a:bodyPr wrap="none" rtlCol="0">
-                      <a:spAutoFit/>
-                    </a:bodyPr>
-                    <a:lstStyle/>
-                    <a:p>
-                      <a:pPr/>
-                      <a14:m>
-                        <m:oMathPara xmlns:m="http://schemas.openxmlformats.org/officeDocument/2006/math">
-                          <m:oMathParaPr>
-                            <m:jc m:val="centerGroup"/>
-                          </m:oMathParaPr>
-                          <m:oMath xmlns:m="http://schemas.openxmlformats.org/officeDocument/2006/math">
-                            <m:r>
-                              <a:rPr lang="en-US" sz="900" i="1">
-                                <a:latin typeface="Cambria Math" charset="0"/>
-                                <a:ea typeface="Cambria Math" charset="0"/>
-                                <a:cs typeface="Cambria Math" charset="0"/>
-                              </a:rPr>
-                              <m:t>𝜋</m:t>
-                            </m:r>
-                            <m:r>
-                              <a:rPr lang="tr-TR" sz="900" i="1">
-                                <a:latin typeface="Cambria Math" charset="0"/>
-                                <a:ea typeface="Cambria Math" charset="0"/>
-                                <a:cs typeface="Cambria Math" charset="0"/>
-                              </a:rPr>
-                              <m:t>/12</m:t>
-                            </m:r>
-                          </m:oMath>
-                        </m:oMathPara>
-                      </a14:m>
-                      <a:endParaRPr lang="en-US" dirty="0"/>
-                    </a:p>
-                  </p:txBody>
-                </p:sp>
-              </mc:Choice>
-              <mc:Fallback>
-                <p:sp>
-                  <p:nvSpPr>
-                    <p:cNvPr id="79" name="Metin kutusu 78">
-                      <a:extLst>
-                        <a:ext uri="{FF2B5EF4-FFF2-40B4-BE49-F238E27FC236}">
-                          <a16:creationId xmlns:a16="http://schemas.microsoft.com/office/drawing/2014/main" id="{5868C204-9BF4-2847-A60A-269AE49CD6FC}"/>
-                        </a:ext>
-                      </a:extLst>
-                    </p:cNvPr>
-                    <p:cNvSpPr txBox="1">
-                      <a:spLocks noRot="1" noChangeAspect="1" noMove="1" noResize="1" noEditPoints="1" noAdjustHandles="1" noChangeArrowheads="1" noChangeShapeType="1" noTextEdit="1"/>
-                    </p:cNvSpPr>
-                    <p:nvPr/>
-                  </p:nvSpPr>
-                  <p:spPr>
-                    <a:xfrm>
-                      <a:off x="9411219" y="3122831"/>
-                      <a:ext cx="553712" cy="307776"/>
-                    </a:xfrm>
-                    <a:prstGeom prst="rect">
-                      <a:avLst/>
-                    </a:prstGeom>
-                    <a:blipFill>
-                      <a:blip r:embed="rId5"/>
-                      <a:stretch>
-                        <a:fillRect/>
-                      </a:stretch>
-                    </a:blipFill>
-                  </p:spPr>
-                  <p:txBody>
-                    <a:bodyPr/>
-                    <a:lstStyle/>
-                    <a:p>
-                      <a:r>
-                        <a:rPr lang="en-US">
-                          <a:noFill/>
-                        </a:rPr>
-                        <a:t> </a:t>
-                      </a:r>
-                    </a:p>
-                  </p:txBody>
-                </p:sp>
-              </mc:Fallback>
-            </mc:AlternateContent>
-            <mc:AlternateContent xmlns:mc="http://schemas.openxmlformats.org/markup-compatibility/2006">
-              <mc:Choice xmlns:a14="http://schemas.microsoft.com/office/drawing/2010/main" Requires="a14">
-                <p:sp>
-                  <p:nvSpPr>
-                    <p:cNvPr id="80" name="Metin kutusu 79">
-                      <a:extLst>
-                        <a:ext uri="{FF2B5EF4-FFF2-40B4-BE49-F238E27FC236}">
-                          <a16:creationId xmlns:a16="http://schemas.microsoft.com/office/drawing/2014/main" id="{D3C6CB03-F017-0549-AE5F-F42FD2DA6CF2}"/>
-                        </a:ext>
-                      </a:extLst>
-                    </p:cNvPr>
-                    <p:cNvSpPr txBox="1"/>
-                    <p:nvPr/>
-                  </p:nvSpPr>
-                  <p:spPr>
-                    <a:xfrm>
-                      <a:off x="9854840" y="3295846"/>
-                      <a:ext cx="478571" cy="307776"/>
-                    </a:xfrm>
-                    <a:prstGeom prst="rect">
-                      <a:avLst/>
-                    </a:prstGeom>
-                    <a:noFill/>
-                  </p:spPr>
-                  <p:txBody>
-                    <a:bodyPr wrap="none" rtlCol="0">
-                      <a:spAutoFit/>
-                    </a:bodyPr>
-                    <a:lstStyle/>
-                    <a:p>
-                      <a:pPr/>
-                      <a14:m>
-                        <m:oMathPara xmlns:m="http://schemas.openxmlformats.org/officeDocument/2006/math">
-                          <m:oMathParaPr>
-                            <m:jc m:val="centerGroup"/>
-                          </m:oMathParaPr>
-                          <m:oMath xmlns:m="http://schemas.openxmlformats.org/officeDocument/2006/math">
-                            <m:r>
-                              <a:rPr lang="en-US" sz="900" i="1">
-                                <a:latin typeface="Cambria Math" charset="0"/>
-                                <a:ea typeface="Cambria Math" charset="0"/>
-                                <a:cs typeface="Cambria Math" charset="0"/>
-                              </a:rPr>
-                              <m:t>𝜋</m:t>
-                            </m:r>
-                            <m:r>
-                              <a:rPr lang="tr-TR" sz="900" i="1">
-                                <a:latin typeface="Cambria Math" charset="0"/>
-                                <a:ea typeface="Cambria Math" charset="0"/>
-                                <a:cs typeface="Cambria Math" charset="0"/>
-                              </a:rPr>
-                              <m:t>/6</m:t>
-                            </m:r>
-                          </m:oMath>
-                        </m:oMathPara>
-                      </a14:m>
-                      <a:endParaRPr lang="en-US" dirty="0"/>
-                    </a:p>
-                  </p:txBody>
-                </p:sp>
-              </mc:Choice>
-              <mc:Fallback>
-                <p:sp>
-                  <p:nvSpPr>
-                    <p:cNvPr id="80" name="Metin kutusu 79">
-                      <a:extLst>
-                        <a:ext uri="{FF2B5EF4-FFF2-40B4-BE49-F238E27FC236}">
-                          <a16:creationId xmlns:a16="http://schemas.microsoft.com/office/drawing/2014/main" id="{D3C6CB03-F017-0549-AE5F-F42FD2DA6CF2}"/>
-                        </a:ext>
-                      </a:extLst>
-                    </p:cNvPr>
-                    <p:cNvSpPr txBox="1">
-                      <a:spLocks noRot="1" noChangeAspect="1" noMove="1" noResize="1" noEditPoints="1" noAdjustHandles="1" noChangeArrowheads="1" noChangeShapeType="1" noTextEdit="1"/>
-                    </p:cNvSpPr>
-                    <p:nvPr/>
-                  </p:nvSpPr>
-                  <p:spPr>
-                    <a:xfrm>
-                      <a:off x="9854840" y="3295846"/>
-                      <a:ext cx="478571" cy="307776"/>
-                    </a:xfrm>
-                    <a:prstGeom prst="rect">
-                      <a:avLst/>
-                    </a:prstGeom>
-                    <a:blipFill>
-                      <a:blip r:embed="rId6"/>
-                      <a:stretch>
-                        <a:fillRect/>
-                      </a:stretch>
-                    </a:blipFill>
-                  </p:spPr>
-                  <p:txBody>
-                    <a:bodyPr/>
-                    <a:lstStyle/>
-                    <a:p>
-                      <a:r>
-                        <a:rPr lang="en-US">
-                          <a:noFill/>
-                        </a:rPr>
-                        <a:t> </a:t>
-                      </a:r>
-                    </a:p>
-                  </p:txBody>
-                </p:sp>
-              </mc:Fallback>
-            </mc:AlternateContent>
-          </p:grpSp>
-          <p:grpSp>
-            <p:nvGrpSpPr>
-              <p:cNvPr id="63" name="Grup 62">
+              <a:prstGeom prst="straightConnector1">
+                <a:avLst/>
+              </a:prstGeom>
+              <a:ln w="25400">
+                <a:solidFill>
+                  <a:schemeClr val="accent2"/>
+                </a:solidFill>
+                <a:tailEnd type="triangle"/>
+              </a:ln>
+            </p:spPr>
+            <p:style>
+              <a:lnRef idx="1">
+                <a:schemeClr val="accent1"/>
+              </a:lnRef>
+              <a:fillRef idx="0">
+                <a:schemeClr val="accent1"/>
+              </a:fillRef>
+              <a:effectRef idx="0">
+                <a:schemeClr val="accent1"/>
+              </a:effectRef>
+              <a:fontRef idx="minor">
+                <a:schemeClr val="tx1"/>
+              </a:fontRef>
+            </p:style>
+          </p:cxnSp>
+          <p:cxnSp>
+            <p:nvCxnSpPr>
+              <p:cNvPr id="69" name="Düz Ok Bağlayıcısı 68">
                 <a:extLst>
                   <a:ext uri="{FF2B5EF4-FFF2-40B4-BE49-F238E27FC236}">
-                    <a16:creationId xmlns:a16="http://schemas.microsoft.com/office/drawing/2014/main" id="{E14F96E5-2FFC-6B42-9C9A-21A41300571F}"/>
+                    <a16:creationId xmlns:a16="http://schemas.microsoft.com/office/drawing/2014/main" id="{28E77484-7E3D-5F45-AB85-BF4205A10E24}"/>
                   </a:ext>
                 </a:extLst>
               </p:cNvPr>
-              <p:cNvGrpSpPr/>
+              <p:cNvCxnSpPr/>
               <p:nvPr/>
-            </p:nvGrpSpPr>
-            <p:grpSpPr>
+            </p:nvCxnSpPr>
+            <p:spPr>
+              <a:xfrm flipV="1">
+                <a:off x="9378709" y="2986763"/>
+                <a:ext cx="16290" cy="1609519"/>
+              </a:xfrm>
+              <a:prstGeom prst="straightConnector1">
+                <a:avLst/>
+              </a:prstGeom>
+              <a:ln w="25400">
+                <a:solidFill>
+                  <a:schemeClr val="accent2"/>
+                </a:solidFill>
+                <a:tailEnd type="triangle"/>
+              </a:ln>
+            </p:spPr>
+            <p:style>
+              <a:lnRef idx="1">
+                <a:schemeClr val="accent1"/>
+              </a:lnRef>
+              <a:fillRef idx="0">
+                <a:schemeClr val="accent1"/>
+              </a:fillRef>
+              <a:effectRef idx="0">
+                <a:schemeClr val="accent1"/>
+              </a:effectRef>
+              <a:fontRef idx="minor">
+                <a:schemeClr val="tx1"/>
+              </a:fontRef>
+            </p:style>
+          </p:cxnSp>
+          <p:sp>
+            <p:nvSpPr>
+              <p:cNvPr id="70" name="Veya 69">
+                <a:extLst>
+                  <a:ext uri="{FF2B5EF4-FFF2-40B4-BE49-F238E27FC236}">
+                    <a16:creationId xmlns:a16="http://schemas.microsoft.com/office/drawing/2014/main" id="{2532DA8D-F133-CC4C-8048-61BA9D48FFA1}"/>
+                  </a:ext>
+                </a:extLst>
+              </p:cNvPr>
+              <p:cNvSpPr/>
+              <p:nvPr/>
+            </p:nvSpPr>
+            <p:spPr>
               <a:xfrm>
-                <a:off x="8434440" y="5725777"/>
-                <a:ext cx="2504431" cy="842843"/>
-                <a:chOff x="10090555" y="1234984"/>
-                <a:chExt cx="2504431" cy="842843"/>
+                <a:off x="8792404" y="4141433"/>
+                <a:ext cx="1016312" cy="962035"/>
               </a:xfrm>
-            </p:grpSpPr>
-            <p:cxnSp>
-              <p:nvCxnSpPr>
-                <p:cNvPr id="64" name="Düz Ok Bağlayıcısı 63">
-                  <a:extLst>
-                    <a:ext uri="{FF2B5EF4-FFF2-40B4-BE49-F238E27FC236}">
-                      <a16:creationId xmlns:a16="http://schemas.microsoft.com/office/drawing/2014/main" id="{8841BB74-58DC-5F49-A492-BFA4CBC0B6E7}"/>
-                    </a:ext>
-                  </a:extLst>
-                </p:cNvPr>
-                <p:cNvCxnSpPr>
-                  <a:cxnSpLocks/>
-                </p:cNvCxnSpPr>
-                <p:nvPr/>
-              </p:nvCxnSpPr>
-              <p:spPr>
-                <a:xfrm flipV="1">
-                  <a:off x="10107884" y="1419650"/>
-                  <a:ext cx="401778" cy="1"/>
-                </a:xfrm>
-                <a:prstGeom prst="straightConnector1">
-                  <a:avLst/>
-                </a:prstGeom>
-                <a:ln w="25400">
+              <a:prstGeom prst="flowChartOr">
+                <a:avLst/>
+              </a:prstGeom>
+              <a:ln w="22225">
+                <a:solidFill>
+                  <a:schemeClr val="accent1">
+                    <a:shade val="50000"/>
+                    <a:alpha val="86000"/>
+                  </a:schemeClr>
+                </a:solidFill>
+              </a:ln>
+            </p:spPr>
+            <p:style>
+              <a:lnRef idx="2">
+                <a:schemeClr val="accent1">
+                  <a:shade val="50000"/>
+                </a:schemeClr>
+              </a:lnRef>
+              <a:fillRef idx="1">
+                <a:schemeClr val="accent1"/>
+              </a:fillRef>
+              <a:effectRef idx="0">
+                <a:schemeClr val="accent1"/>
+              </a:effectRef>
+              <a:fontRef idx="minor">
+                <a:schemeClr val="lt1"/>
+              </a:fontRef>
+            </p:style>
+            <p:txBody>
+              <a:bodyPr rtlCol="0" anchor="ctr"/>
+              <a:lstStyle/>
+              <a:p>
+                <a:pPr algn="ctr"/>
+                <a:endParaRPr lang="en-US" dirty="0">
                   <a:solidFill>
-                    <a:schemeClr val="accent2"/>
+                    <a:srgbClr val="92D050"/>
                   </a:solidFill>
-                  <a:tailEnd type="triangle"/>
-                </a:ln>
-              </p:spPr>
-              <p:style>
-                <a:lnRef idx="1">
-                  <a:schemeClr val="accent1"/>
-                </a:lnRef>
-                <a:fillRef idx="0">
-                  <a:schemeClr val="accent1"/>
-                </a:fillRef>
-                <a:effectRef idx="0">
-                  <a:schemeClr val="accent1"/>
-                </a:effectRef>
-                <a:fontRef idx="minor">
-                  <a:schemeClr val="tx1"/>
-                </a:fontRef>
-              </p:style>
-            </p:cxnSp>
-            <p:cxnSp>
-              <p:nvCxnSpPr>
-                <p:cNvPr id="65" name="Düz Bağlayıcı 64">
-                  <a:extLst>
-                    <a:ext uri="{FF2B5EF4-FFF2-40B4-BE49-F238E27FC236}">
-                      <a16:creationId xmlns:a16="http://schemas.microsoft.com/office/drawing/2014/main" id="{0C7D7C59-D1CD-2642-8545-065218FA8E37}"/>
-                    </a:ext>
-                  </a:extLst>
-                </p:cNvPr>
-                <p:cNvCxnSpPr>
-                  <a:cxnSpLocks/>
-                </p:cNvCxnSpPr>
-                <p:nvPr/>
-              </p:nvCxnSpPr>
-              <p:spPr>
-                <a:xfrm flipV="1">
-                  <a:off x="10090555" y="1770051"/>
-                  <a:ext cx="379456" cy="1"/>
-                </a:xfrm>
-                <a:prstGeom prst="line">
-                  <a:avLst/>
-                </a:prstGeom>
-                <a:ln w="31750">
-                  <a:solidFill>
-                    <a:schemeClr val="accent6"/>
-                  </a:solidFill>
-                  <a:prstDash val="sysDot"/>
-                </a:ln>
-              </p:spPr>
-              <p:style>
-                <a:lnRef idx="1">
-                  <a:schemeClr val="accent1"/>
-                </a:lnRef>
-                <a:fillRef idx="0">
-                  <a:schemeClr val="accent1"/>
-                </a:fillRef>
-                <a:effectRef idx="0">
-                  <a:schemeClr val="accent1"/>
-                </a:effectRef>
-                <a:fontRef idx="minor">
-                  <a:schemeClr val="tx1"/>
-                </a:fontRef>
-              </p:style>
-            </p:cxnSp>
-            <p:sp>
-              <p:nvSpPr>
-                <p:cNvPr id="66" name="Metin kutusu 65">
-                  <a:extLst>
-                    <a:ext uri="{FF2B5EF4-FFF2-40B4-BE49-F238E27FC236}">
-                      <a16:creationId xmlns:a16="http://schemas.microsoft.com/office/drawing/2014/main" id="{51AE4F97-CD17-3841-B153-78843BF603B1}"/>
-                    </a:ext>
-                  </a:extLst>
-                </p:cNvPr>
-                <p:cNvSpPr txBox="1"/>
-                <p:nvPr/>
-              </p:nvSpPr>
-              <p:spPr>
-                <a:xfrm>
-                  <a:off x="10470011" y="1234984"/>
-                  <a:ext cx="1944638" cy="492442"/>
-                </a:xfrm>
-                <a:prstGeom prst="rect">
-                  <a:avLst/>
-                </a:prstGeom>
-                <a:noFill/>
-              </p:spPr>
-              <p:txBody>
-                <a:bodyPr wrap="none" rtlCol="0">
-                  <a:spAutoFit/>
-                </a:bodyPr>
-                <a:lstStyle/>
-                <a:p>
-                  <a:r>
-                    <a:rPr lang="en-US" dirty="0"/>
-                    <a:t>Linear velocity</a:t>
-                  </a:r>
-                </a:p>
-              </p:txBody>
-            </p:sp>
-            <p:sp>
-              <p:nvSpPr>
-                <p:cNvPr id="67" name="Metin kutusu 66">
-                  <a:extLst>
-                    <a:ext uri="{FF2B5EF4-FFF2-40B4-BE49-F238E27FC236}">
-                      <a16:creationId xmlns:a16="http://schemas.microsoft.com/office/drawing/2014/main" id="{6F0C2BD4-5FFC-254F-9500-CFA4E2424F59}"/>
-                    </a:ext>
-                  </a:extLst>
-                </p:cNvPr>
-                <p:cNvSpPr txBox="1"/>
-                <p:nvPr/>
-              </p:nvSpPr>
-              <p:spPr>
-                <a:xfrm>
-                  <a:off x="10470011" y="1585385"/>
-                  <a:ext cx="2124975" cy="492442"/>
-                </a:xfrm>
-                <a:prstGeom prst="rect">
-                  <a:avLst/>
-                </a:prstGeom>
-                <a:noFill/>
-              </p:spPr>
-              <p:txBody>
-                <a:bodyPr wrap="none" rtlCol="0">
-                  <a:spAutoFit/>
-                </a:bodyPr>
-                <a:lstStyle/>
-                <a:p>
-                  <a:r>
-                    <a:rPr lang="en-US" dirty="0"/>
-                    <a:t>Angular velocity</a:t>
-                  </a:r>
-                </a:p>
-              </p:txBody>
-            </p:sp>
-          </p:grpSp>
+                </a:endParaRPr>
+              </a:p>
+            </p:txBody>
+          </p:sp>
+          <p:sp>
+            <p:nvSpPr>
+              <p:cNvPr id="71" name="Metin kutusu 70">
+                <a:extLst>
+                  <a:ext uri="{FF2B5EF4-FFF2-40B4-BE49-F238E27FC236}">
+                    <a16:creationId xmlns:a16="http://schemas.microsoft.com/office/drawing/2014/main" id="{6E1AB2DC-7A32-8B48-9CF6-9E9F626B2EFA}"/>
+                  </a:ext>
+                </a:extLst>
+              </p:cNvPr>
+              <p:cNvSpPr txBox="1"/>
+              <p:nvPr/>
+            </p:nvSpPr>
+            <p:spPr>
+              <a:xfrm>
+                <a:off x="8817680" y="2171554"/>
+                <a:ext cx="568675" cy="306342"/>
+              </a:xfrm>
+              <a:prstGeom prst="rect">
+                <a:avLst/>
+              </a:prstGeom>
+              <a:noFill/>
+            </p:spPr>
+            <p:txBody>
+              <a:bodyPr wrap="none" rtlCol="0">
+                <a:spAutoFit/>
+              </a:bodyPr>
+              <a:lstStyle/>
+              <a:p>
+                <a:r>
+                  <a:rPr lang="en-US" sz="1100" dirty="0"/>
+                  <a:t>0.4m</a:t>
+                </a:r>
+                <a:r>
+                  <a:rPr lang="en-US" sz="1050" dirty="0"/>
+                  <a:t>/s</a:t>
+                </a:r>
+              </a:p>
+            </p:txBody>
+          </p:sp>
+          <p:sp>
+            <p:nvSpPr>
+              <p:cNvPr id="72" name="Metin kutusu 71">
+                <a:extLst>
+                  <a:ext uri="{FF2B5EF4-FFF2-40B4-BE49-F238E27FC236}">
+                    <a16:creationId xmlns:a16="http://schemas.microsoft.com/office/drawing/2014/main" id="{826074EC-B482-7341-A7C8-6F50EA82CF53}"/>
+                  </a:ext>
+                </a:extLst>
+              </p:cNvPr>
+              <p:cNvSpPr txBox="1"/>
+              <p:nvPr/>
+            </p:nvSpPr>
+            <p:spPr>
+              <a:xfrm>
+                <a:off x="9283929" y="2696482"/>
+                <a:ext cx="568675" cy="306342"/>
+              </a:xfrm>
+              <a:prstGeom prst="rect">
+                <a:avLst/>
+              </a:prstGeom>
+              <a:noFill/>
+            </p:spPr>
+            <p:txBody>
+              <a:bodyPr wrap="none" rtlCol="0">
+                <a:spAutoFit/>
+              </a:bodyPr>
+              <a:lstStyle/>
+              <a:p>
+                <a:r>
+                  <a:rPr lang="en-US" sz="1100" dirty="0"/>
+                  <a:t>0.2m</a:t>
+                </a:r>
+                <a:r>
+                  <a:rPr lang="en-US" sz="1050" dirty="0"/>
+                  <a:t>/s</a:t>
+                </a:r>
+              </a:p>
+            </p:txBody>
+          </p:sp>
+          <p:cxnSp>
+            <p:nvCxnSpPr>
+              <p:cNvPr id="73" name="Düz Bağlayıcı 72">
+                <a:extLst>
+                  <a:ext uri="{FF2B5EF4-FFF2-40B4-BE49-F238E27FC236}">
+                    <a16:creationId xmlns:a16="http://schemas.microsoft.com/office/drawing/2014/main" id="{C7D19379-38F8-A343-90E1-34B0AB082166}"/>
+                  </a:ext>
+                </a:extLst>
+              </p:cNvPr>
+              <p:cNvCxnSpPr/>
+              <p:nvPr/>
+            </p:nvCxnSpPr>
+            <p:spPr>
+              <a:xfrm flipH="1" flipV="1">
+                <a:off x="9000646" y="3411313"/>
+                <a:ext cx="283283" cy="1193082"/>
+              </a:xfrm>
+              <a:prstGeom prst="line">
+                <a:avLst/>
+              </a:prstGeom>
+              <a:ln w="31750">
+                <a:solidFill>
+                  <a:schemeClr val="accent6"/>
+                </a:solidFill>
+                <a:prstDash val="sysDot"/>
+              </a:ln>
+            </p:spPr>
+            <p:style>
+              <a:lnRef idx="1">
+                <a:schemeClr val="accent1"/>
+              </a:lnRef>
+              <a:fillRef idx="0">
+                <a:schemeClr val="accent1"/>
+              </a:fillRef>
+              <a:effectRef idx="0">
+                <a:schemeClr val="accent1"/>
+              </a:effectRef>
+              <a:fontRef idx="minor">
+                <a:schemeClr val="tx1"/>
+              </a:fontRef>
+            </p:style>
+          </p:cxnSp>
+          <p:cxnSp>
+            <p:nvCxnSpPr>
+              <p:cNvPr id="74" name="Düz Bağlayıcı 73">
+                <a:extLst>
+                  <a:ext uri="{FF2B5EF4-FFF2-40B4-BE49-F238E27FC236}">
+                    <a16:creationId xmlns:a16="http://schemas.microsoft.com/office/drawing/2014/main" id="{13AC7879-5785-1347-B4DC-724EF603AD4D}"/>
+                  </a:ext>
+                </a:extLst>
+              </p:cNvPr>
+              <p:cNvCxnSpPr/>
+              <p:nvPr/>
+            </p:nvCxnSpPr>
+            <p:spPr>
+              <a:xfrm flipH="1" flipV="1">
+                <a:off x="8672404" y="3518402"/>
+                <a:ext cx="611526" cy="1104050"/>
+              </a:xfrm>
+              <a:prstGeom prst="line">
+                <a:avLst/>
+              </a:prstGeom>
+              <a:ln w="31750">
+                <a:solidFill>
+                  <a:schemeClr val="accent6"/>
+                </a:solidFill>
+                <a:prstDash val="sysDot"/>
+              </a:ln>
+            </p:spPr>
+            <p:style>
+              <a:lnRef idx="1">
+                <a:schemeClr val="accent1"/>
+              </a:lnRef>
+              <a:fillRef idx="0">
+                <a:schemeClr val="accent1"/>
+              </a:fillRef>
+              <a:effectRef idx="0">
+                <a:schemeClr val="accent1"/>
+              </a:effectRef>
+              <a:fontRef idx="minor">
+                <a:schemeClr val="tx1"/>
+              </a:fontRef>
+            </p:style>
+          </p:cxnSp>
+          <p:cxnSp>
+            <p:nvCxnSpPr>
+              <p:cNvPr id="75" name="Düz Bağlayıcı 74">
+                <a:extLst>
+                  <a:ext uri="{FF2B5EF4-FFF2-40B4-BE49-F238E27FC236}">
+                    <a16:creationId xmlns:a16="http://schemas.microsoft.com/office/drawing/2014/main" id="{84FE772B-9AC2-014B-8C8E-846C0C068B40}"/>
+                  </a:ext>
+                </a:extLst>
+              </p:cNvPr>
+              <p:cNvCxnSpPr/>
+              <p:nvPr/>
+            </p:nvCxnSpPr>
+            <p:spPr>
+              <a:xfrm flipV="1">
+                <a:off x="9317192" y="3376437"/>
+                <a:ext cx="240696" cy="1234556"/>
+              </a:xfrm>
+              <a:prstGeom prst="line">
+                <a:avLst/>
+              </a:prstGeom>
+              <a:ln w="31750">
+                <a:solidFill>
+                  <a:schemeClr val="accent6"/>
+                </a:solidFill>
+                <a:prstDash val="sysDot"/>
+              </a:ln>
+            </p:spPr>
+            <p:style>
+              <a:lnRef idx="1">
+                <a:schemeClr val="accent1"/>
+              </a:lnRef>
+              <a:fillRef idx="0">
+                <a:schemeClr val="accent1"/>
+              </a:fillRef>
+              <a:effectRef idx="0">
+                <a:schemeClr val="accent1"/>
+              </a:effectRef>
+              <a:fontRef idx="minor">
+                <a:schemeClr val="tx1"/>
+              </a:fontRef>
+            </p:style>
+          </p:cxnSp>
+          <p:cxnSp>
+            <p:nvCxnSpPr>
+              <p:cNvPr id="76" name="Düz Bağlayıcı 75">
+                <a:extLst>
+                  <a:ext uri="{FF2B5EF4-FFF2-40B4-BE49-F238E27FC236}">
+                    <a16:creationId xmlns:a16="http://schemas.microsoft.com/office/drawing/2014/main" id="{40BD3E9E-A4FB-5443-A820-E640AD791E00}"/>
+                  </a:ext>
+                </a:extLst>
+              </p:cNvPr>
+              <p:cNvCxnSpPr>
+                <a:endCxn id="80" idx="1"/>
+              </p:cNvCxnSpPr>
+              <p:nvPr/>
+            </p:nvCxnSpPr>
+            <p:spPr>
+              <a:xfrm flipV="1">
+                <a:off x="9317192" y="3440007"/>
+                <a:ext cx="537648" cy="1170989"/>
+              </a:xfrm>
+              <a:prstGeom prst="line">
+                <a:avLst/>
+              </a:prstGeom>
+              <a:ln w="31750">
+                <a:solidFill>
+                  <a:schemeClr val="accent6"/>
+                </a:solidFill>
+                <a:prstDash val="sysDot"/>
+              </a:ln>
+            </p:spPr>
+            <p:style>
+              <a:lnRef idx="1">
+                <a:schemeClr val="accent1"/>
+              </a:lnRef>
+              <a:fillRef idx="0">
+                <a:schemeClr val="accent1"/>
+              </a:fillRef>
+              <a:effectRef idx="0">
+                <a:schemeClr val="accent1"/>
+              </a:effectRef>
+              <a:fontRef idx="minor">
+                <a:schemeClr val="tx1"/>
+              </a:fontRef>
+            </p:style>
+          </p:cxnSp>
+          <mc:AlternateContent xmlns:mc="http://schemas.openxmlformats.org/markup-compatibility/2006">
+            <mc:Choice xmlns:a14="http://schemas.microsoft.com/office/drawing/2010/main" Requires="a14">
+              <p:sp>
+                <p:nvSpPr>
+                  <p:cNvPr id="77" name="Metin kutusu 76">
+                    <a:extLst>
+                      <a:ext uri="{FF2B5EF4-FFF2-40B4-BE49-F238E27FC236}">
+                        <a16:creationId xmlns:a16="http://schemas.microsoft.com/office/drawing/2014/main" id="{3BA81818-DBD5-604F-805B-1BFBB4F4618A}"/>
+                      </a:ext>
+                    </a:extLst>
+                  </p:cNvPr>
+                  <p:cNvSpPr txBox="1"/>
+                  <p:nvPr/>
+                </p:nvSpPr>
+                <p:spPr>
+                  <a:xfrm>
+                    <a:off x="8592433" y="3103233"/>
+                    <a:ext cx="565219" cy="288322"/>
+                  </a:xfrm>
+                  <a:prstGeom prst="rect">
+                    <a:avLst/>
+                  </a:prstGeom>
+                  <a:noFill/>
+                </p:spPr>
+                <p:txBody>
+                  <a:bodyPr wrap="none" rtlCol="0">
+                    <a:spAutoFit/>
+                  </a:bodyPr>
+                  <a:lstStyle/>
+                  <a:p>
+                    <a:pPr/>
+                    <a14:m>
+                      <m:oMathPara xmlns:m="http://schemas.openxmlformats.org/officeDocument/2006/math">
+                        <m:oMathParaPr>
+                          <m:jc m:val="centerGroup"/>
+                        </m:oMathParaPr>
+                        <m:oMath xmlns:m="http://schemas.openxmlformats.org/officeDocument/2006/math">
+                          <m:r>
+                            <a:rPr lang="tr-TR" sz="1000" i="1">
+                              <a:latin typeface="Cambria Math" charset="0"/>
+                              <a:ea typeface="Cambria Math" charset="0"/>
+                              <a:cs typeface="Cambria Math" charset="0"/>
+                            </a:rPr>
+                            <m:t>−</m:t>
+                          </m:r>
+                          <m:r>
+                            <a:rPr lang="en-US" sz="1000" i="1">
+                              <a:latin typeface="Cambria Math" charset="0"/>
+                              <a:ea typeface="Cambria Math" charset="0"/>
+                              <a:cs typeface="Cambria Math" charset="0"/>
+                            </a:rPr>
+                            <m:t>𝜋</m:t>
+                          </m:r>
+                          <m:r>
+                            <a:rPr lang="tr-TR" sz="1000" i="1">
+                              <a:latin typeface="Cambria Math" charset="0"/>
+                              <a:ea typeface="Cambria Math" charset="0"/>
+                              <a:cs typeface="Cambria Math" charset="0"/>
+                            </a:rPr>
+                            <m:t>/12</m:t>
+                          </m:r>
+                        </m:oMath>
+                      </m:oMathPara>
+                    </a14:m>
+                    <a:endParaRPr lang="en-US" dirty="0"/>
+                  </a:p>
+                </p:txBody>
+              </p:sp>
+            </mc:Choice>
+            <mc:Fallback>
+              <p:sp>
+                <p:nvSpPr>
+                  <p:cNvPr id="77" name="Metin kutusu 76">
+                    <a:extLst>
+                      <a:ext uri="{FF2B5EF4-FFF2-40B4-BE49-F238E27FC236}">
+                        <a16:creationId xmlns:a16="http://schemas.microsoft.com/office/drawing/2014/main" id="{3BA81818-DBD5-604F-805B-1BFBB4F4618A}"/>
+                      </a:ext>
+                    </a:extLst>
+                  </p:cNvPr>
+                  <p:cNvSpPr txBox="1">
+                    <a:spLocks noRot="1" noChangeAspect="1" noMove="1" noResize="1" noEditPoints="1" noAdjustHandles="1" noChangeArrowheads="1" noChangeShapeType="1" noTextEdit="1"/>
+                  </p:cNvSpPr>
+                  <p:nvPr/>
+                </p:nvSpPr>
+                <p:spPr>
+                  <a:xfrm>
+                    <a:off x="8592433" y="3103233"/>
+                    <a:ext cx="565219" cy="288322"/>
+                  </a:xfrm>
+                  <a:prstGeom prst="rect">
+                    <a:avLst/>
+                  </a:prstGeom>
+                  <a:blipFill>
+                    <a:blip r:embed="rId3"/>
+                    <a:stretch>
+                      <a:fillRect b="-5000"/>
+                    </a:stretch>
+                  </a:blipFill>
+                </p:spPr>
+                <p:txBody>
+                  <a:bodyPr/>
+                  <a:lstStyle/>
+                  <a:p>
+                    <a:r>
+                      <a:rPr lang="en-US">
+                        <a:noFill/>
+                      </a:rPr>
+                      <a:t> </a:t>
+                    </a:r>
+                  </a:p>
+                </p:txBody>
+              </p:sp>
+            </mc:Fallback>
+          </mc:AlternateContent>
+          <mc:AlternateContent xmlns:mc="http://schemas.openxmlformats.org/markup-compatibility/2006">
+            <mc:Choice xmlns:a14="http://schemas.microsoft.com/office/drawing/2010/main" Requires="a14">
+              <p:sp>
+                <p:nvSpPr>
+                  <p:cNvPr id="78" name="Metin kutusu 77">
+                    <a:extLst>
+                      <a:ext uri="{FF2B5EF4-FFF2-40B4-BE49-F238E27FC236}">
+                        <a16:creationId xmlns:a16="http://schemas.microsoft.com/office/drawing/2014/main" id="{D110CBC8-F97F-BC47-B9D0-06B3EFE73697}"/>
+                      </a:ext>
+                    </a:extLst>
+                  </p:cNvPr>
+                  <p:cNvSpPr txBox="1"/>
+                  <p:nvPr/>
+                </p:nvSpPr>
+                <p:spPr>
+                  <a:xfrm>
+                    <a:off x="8226595" y="3384359"/>
+                    <a:ext cx="498529" cy="288322"/>
+                  </a:xfrm>
+                  <a:prstGeom prst="rect">
+                    <a:avLst/>
+                  </a:prstGeom>
+                  <a:noFill/>
+                </p:spPr>
+                <p:txBody>
+                  <a:bodyPr wrap="none" rtlCol="0">
+                    <a:spAutoFit/>
+                  </a:bodyPr>
+                  <a:lstStyle/>
+                  <a:p>
+                    <a:pPr/>
+                    <a14:m>
+                      <m:oMathPara xmlns:m="http://schemas.openxmlformats.org/officeDocument/2006/math">
+                        <m:oMathParaPr>
+                          <m:jc m:val="centerGroup"/>
+                        </m:oMathParaPr>
+                        <m:oMath xmlns:m="http://schemas.openxmlformats.org/officeDocument/2006/math">
+                          <m:r>
+                            <a:rPr lang="tr-TR" sz="1000" i="1">
+                              <a:latin typeface="Cambria Math" charset="0"/>
+                              <a:ea typeface="Cambria Math" charset="0"/>
+                              <a:cs typeface="Cambria Math" charset="0"/>
+                            </a:rPr>
+                            <m:t>−</m:t>
+                          </m:r>
+                          <m:r>
+                            <a:rPr lang="en-US" sz="1000" i="1">
+                              <a:latin typeface="Cambria Math" charset="0"/>
+                              <a:ea typeface="Cambria Math" charset="0"/>
+                              <a:cs typeface="Cambria Math" charset="0"/>
+                            </a:rPr>
+                            <m:t>𝜋</m:t>
+                          </m:r>
+                          <m:r>
+                            <a:rPr lang="tr-TR" sz="1000" i="1">
+                              <a:latin typeface="Cambria Math" charset="0"/>
+                              <a:ea typeface="Cambria Math" charset="0"/>
+                              <a:cs typeface="Cambria Math" charset="0"/>
+                            </a:rPr>
+                            <m:t>/6</m:t>
+                          </m:r>
+                        </m:oMath>
+                      </m:oMathPara>
+                    </a14:m>
+                    <a:endParaRPr lang="en-US" dirty="0"/>
+                  </a:p>
+                </p:txBody>
+              </p:sp>
+            </mc:Choice>
+            <mc:Fallback>
+              <p:sp>
+                <p:nvSpPr>
+                  <p:cNvPr id="78" name="Metin kutusu 77">
+                    <a:extLst>
+                      <a:ext uri="{FF2B5EF4-FFF2-40B4-BE49-F238E27FC236}">
+                        <a16:creationId xmlns:a16="http://schemas.microsoft.com/office/drawing/2014/main" id="{D110CBC8-F97F-BC47-B9D0-06B3EFE73697}"/>
+                      </a:ext>
+                    </a:extLst>
+                  </p:cNvPr>
+                  <p:cNvSpPr txBox="1">
+                    <a:spLocks noRot="1" noChangeAspect="1" noMove="1" noResize="1" noEditPoints="1" noAdjustHandles="1" noChangeArrowheads="1" noChangeShapeType="1" noTextEdit="1"/>
+                  </p:cNvSpPr>
+                  <p:nvPr/>
+                </p:nvSpPr>
+                <p:spPr>
+                  <a:xfrm>
+                    <a:off x="8226595" y="3384359"/>
+                    <a:ext cx="498529" cy="288322"/>
+                  </a:xfrm>
+                  <a:prstGeom prst="rect">
+                    <a:avLst/>
+                  </a:prstGeom>
+                  <a:blipFill>
+                    <a:blip r:embed="rId4"/>
+                    <a:stretch>
+                      <a:fillRect/>
+                    </a:stretch>
+                  </a:blipFill>
+                </p:spPr>
+                <p:txBody>
+                  <a:bodyPr/>
+                  <a:lstStyle/>
+                  <a:p>
+                    <a:r>
+                      <a:rPr lang="en-US">
+                        <a:noFill/>
+                      </a:rPr>
+                      <a:t> </a:t>
+                    </a:r>
+                  </a:p>
+                </p:txBody>
+              </p:sp>
+            </mc:Fallback>
+          </mc:AlternateContent>
+          <mc:AlternateContent xmlns:mc="http://schemas.openxmlformats.org/markup-compatibility/2006">
+            <mc:Choice xmlns:a14="http://schemas.microsoft.com/office/drawing/2010/main" Requires="a14">
+              <p:sp>
+                <p:nvSpPr>
+                  <p:cNvPr id="79" name="Metin kutusu 78">
+                    <a:extLst>
+                      <a:ext uri="{FF2B5EF4-FFF2-40B4-BE49-F238E27FC236}">
+                        <a16:creationId xmlns:a16="http://schemas.microsoft.com/office/drawing/2014/main" id="{5868C204-9BF4-2847-A60A-269AE49CD6FC}"/>
+                      </a:ext>
+                    </a:extLst>
+                  </p:cNvPr>
+                  <p:cNvSpPr txBox="1"/>
+                  <p:nvPr/>
+                </p:nvSpPr>
+                <p:spPr>
+                  <a:xfrm>
+                    <a:off x="9411219" y="3122831"/>
+                    <a:ext cx="474280" cy="288322"/>
+                  </a:xfrm>
+                  <a:prstGeom prst="rect">
+                    <a:avLst/>
+                  </a:prstGeom>
+                  <a:noFill/>
+                </p:spPr>
+                <p:txBody>
+                  <a:bodyPr wrap="none" rtlCol="0">
+                    <a:spAutoFit/>
+                  </a:bodyPr>
+                  <a:lstStyle/>
+                  <a:p>
+                    <a:pPr/>
+                    <a14:m>
+                      <m:oMathPara xmlns:m="http://schemas.openxmlformats.org/officeDocument/2006/math">
+                        <m:oMathParaPr>
+                          <m:jc m:val="centerGroup"/>
+                        </m:oMathParaPr>
+                        <m:oMath xmlns:m="http://schemas.openxmlformats.org/officeDocument/2006/math">
+                          <m:r>
+                            <a:rPr lang="en-US" sz="1000" i="1">
+                              <a:latin typeface="Cambria Math" charset="0"/>
+                              <a:ea typeface="Cambria Math" charset="0"/>
+                              <a:cs typeface="Cambria Math" charset="0"/>
+                            </a:rPr>
+                            <m:t>𝜋</m:t>
+                          </m:r>
+                          <m:r>
+                            <a:rPr lang="tr-TR" sz="1000" i="1">
+                              <a:latin typeface="Cambria Math" charset="0"/>
+                              <a:ea typeface="Cambria Math" charset="0"/>
+                              <a:cs typeface="Cambria Math" charset="0"/>
+                            </a:rPr>
+                            <m:t>/12</m:t>
+                          </m:r>
+                        </m:oMath>
+                      </m:oMathPara>
+                    </a14:m>
+                    <a:endParaRPr lang="en-US" dirty="0"/>
+                  </a:p>
+                </p:txBody>
+              </p:sp>
+            </mc:Choice>
+            <mc:Fallback>
+              <p:sp>
+                <p:nvSpPr>
+                  <p:cNvPr id="79" name="Metin kutusu 78">
+                    <a:extLst>
+                      <a:ext uri="{FF2B5EF4-FFF2-40B4-BE49-F238E27FC236}">
+                        <a16:creationId xmlns:a16="http://schemas.microsoft.com/office/drawing/2014/main" id="{5868C204-9BF4-2847-A60A-269AE49CD6FC}"/>
+                      </a:ext>
+                    </a:extLst>
+                  </p:cNvPr>
+                  <p:cNvSpPr txBox="1">
+                    <a:spLocks noRot="1" noChangeAspect="1" noMove="1" noResize="1" noEditPoints="1" noAdjustHandles="1" noChangeArrowheads="1" noChangeShapeType="1" noTextEdit="1"/>
+                  </p:cNvSpPr>
+                  <p:nvPr/>
+                </p:nvSpPr>
+                <p:spPr>
+                  <a:xfrm>
+                    <a:off x="9411219" y="3122831"/>
+                    <a:ext cx="474280" cy="288322"/>
+                  </a:xfrm>
+                  <a:prstGeom prst="rect">
+                    <a:avLst/>
+                  </a:prstGeom>
+                  <a:blipFill>
+                    <a:blip r:embed="rId5"/>
+                    <a:stretch>
+                      <a:fillRect/>
+                    </a:stretch>
+                  </a:blipFill>
+                </p:spPr>
+                <p:txBody>
+                  <a:bodyPr/>
+                  <a:lstStyle/>
+                  <a:p>
+                    <a:r>
+                      <a:rPr lang="en-US">
+                        <a:noFill/>
+                      </a:rPr>
+                      <a:t> </a:t>
+                    </a:r>
+                  </a:p>
+                </p:txBody>
+              </p:sp>
+            </mc:Fallback>
+          </mc:AlternateContent>
+          <mc:AlternateContent xmlns:mc="http://schemas.openxmlformats.org/markup-compatibility/2006">
+            <mc:Choice xmlns:a14="http://schemas.microsoft.com/office/drawing/2010/main" Requires="a14">
+              <p:sp>
+                <p:nvSpPr>
+                  <p:cNvPr id="80" name="Metin kutusu 79">
+                    <a:extLst>
+                      <a:ext uri="{FF2B5EF4-FFF2-40B4-BE49-F238E27FC236}">
+                        <a16:creationId xmlns:a16="http://schemas.microsoft.com/office/drawing/2014/main" id="{D3C6CB03-F017-0549-AE5F-F42FD2DA6CF2}"/>
+                      </a:ext>
+                    </a:extLst>
+                  </p:cNvPr>
+                  <p:cNvSpPr txBox="1"/>
+                  <p:nvPr/>
+                </p:nvSpPr>
+                <p:spPr>
+                  <a:xfrm>
+                    <a:off x="9854840" y="3295846"/>
+                    <a:ext cx="407590" cy="288322"/>
+                  </a:xfrm>
+                  <a:prstGeom prst="rect">
+                    <a:avLst/>
+                  </a:prstGeom>
+                  <a:noFill/>
+                </p:spPr>
+                <p:txBody>
+                  <a:bodyPr wrap="none" rtlCol="0">
+                    <a:spAutoFit/>
+                  </a:bodyPr>
+                  <a:lstStyle/>
+                  <a:p>
+                    <a:pPr/>
+                    <a14:m>
+                      <m:oMathPara xmlns:m="http://schemas.openxmlformats.org/officeDocument/2006/math">
+                        <m:oMathParaPr>
+                          <m:jc m:val="centerGroup"/>
+                        </m:oMathParaPr>
+                        <m:oMath xmlns:m="http://schemas.openxmlformats.org/officeDocument/2006/math">
+                          <m:r>
+                            <a:rPr lang="en-US" sz="1000" i="1">
+                              <a:latin typeface="Cambria Math" charset="0"/>
+                              <a:ea typeface="Cambria Math" charset="0"/>
+                              <a:cs typeface="Cambria Math" charset="0"/>
+                            </a:rPr>
+                            <m:t>𝜋</m:t>
+                          </m:r>
+                          <m:r>
+                            <a:rPr lang="tr-TR" sz="1000" i="1">
+                              <a:latin typeface="Cambria Math" charset="0"/>
+                              <a:ea typeface="Cambria Math" charset="0"/>
+                              <a:cs typeface="Cambria Math" charset="0"/>
+                            </a:rPr>
+                            <m:t>/6</m:t>
+                          </m:r>
+                        </m:oMath>
+                      </m:oMathPara>
+                    </a14:m>
+                    <a:endParaRPr lang="en-US" sz="2000" dirty="0"/>
+                  </a:p>
+                </p:txBody>
+              </p:sp>
+            </mc:Choice>
+            <mc:Fallback>
+              <p:sp>
+                <p:nvSpPr>
+                  <p:cNvPr id="80" name="Metin kutusu 79">
+                    <a:extLst>
+                      <a:ext uri="{FF2B5EF4-FFF2-40B4-BE49-F238E27FC236}">
+                        <a16:creationId xmlns:a16="http://schemas.microsoft.com/office/drawing/2014/main" id="{D3C6CB03-F017-0549-AE5F-F42FD2DA6CF2}"/>
+                      </a:ext>
+                    </a:extLst>
+                  </p:cNvPr>
+                  <p:cNvSpPr txBox="1">
+                    <a:spLocks noRot="1" noChangeAspect="1" noMove="1" noResize="1" noEditPoints="1" noAdjustHandles="1" noChangeArrowheads="1" noChangeShapeType="1" noTextEdit="1"/>
+                  </p:cNvSpPr>
+                  <p:nvPr/>
+                </p:nvSpPr>
+                <p:spPr>
+                  <a:xfrm>
+                    <a:off x="9854840" y="3295846"/>
+                    <a:ext cx="407590" cy="288322"/>
+                  </a:xfrm>
+                  <a:prstGeom prst="rect">
+                    <a:avLst/>
+                  </a:prstGeom>
+                  <a:blipFill>
+                    <a:blip r:embed="rId6"/>
+                    <a:stretch>
+                      <a:fillRect b="-5263"/>
+                    </a:stretch>
+                  </a:blipFill>
+                </p:spPr>
+                <p:txBody>
+                  <a:bodyPr/>
+                  <a:lstStyle/>
+                  <a:p>
+                    <a:r>
+                      <a:rPr lang="en-US">
+                        <a:noFill/>
+                      </a:rPr>
+                      <a:t> </a:t>
+                    </a:r>
+                  </a:p>
+                </p:txBody>
+              </p:sp>
+            </mc:Fallback>
+          </mc:AlternateContent>
+        </p:grpSp>
+        <p:grpSp>
+          <p:nvGrpSpPr>
+            <p:cNvPr id="63" name="Grup 62">
+              <a:extLst>
+                <a:ext uri="{FF2B5EF4-FFF2-40B4-BE49-F238E27FC236}">
+                  <a16:creationId xmlns:a16="http://schemas.microsoft.com/office/drawing/2014/main" id="{E14F96E5-2FFC-6B42-9C9A-21A41300571F}"/>
+                </a:ext>
+              </a:extLst>
+            </p:cNvPr>
+            <p:cNvGrpSpPr/>
+            <p:nvPr/>
+          </p:nvGrpSpPr>
+          <p:grpSpPr>
+            <a:xfrm>
+              <a:off x="8438224" y="5190166"/>
+              <a:ext cx="1577128" cy="674765"/>
+              <a:chOff x="10094339" y="699373"/>
+              <a:chExt cx="1577128" cy="674765"/>
+            </a:xfrm>
+          </p:grpSpPr>
+          <p:cxnSp>
+            <p:nvCxnSpPr>
+              <p:cNvPr id="64" name="Düz Ok Bağlayıcısı 63">
+                <a:extLst>
+                  <a:ext uri="{FF2B5EF4-FFF2-40B4-BE49-F238E27FC236}">
+                    <a16:creationId xmlns:a16="http://schemas.microsoft.com/office/drawing/2014/main" id="{8841BB74-58DC-5F49-A492-BFA4CBC0B6E7}"/>
+                  </a:ext>
+                </a:extLst>
+              </p:cNvPr>
+              <p:cNvCxnSpPr>
+                <a:cxnSpLocks/>
+              </p:cNvCxnSpPr>
+              <p:nvPr/>
+            </p:nvCxnSpPr>
+            <p:spPr>
+              <a:xfrm flipV="1">
+                <a:off x="10111668" y="884039"/>
+                <a:ext cx="401778" cy="1"/>
+              </a:xfrm>
+              <a:prstGeom prst="straightConnector1">
+                <a:avLst/>
+              </a:prstGeom>
+              <a:ln w="25400">
+                <a:solidFill>
+                  <a:schemeClr val="accent2"/>
+                </a:solidFill>
+                <a:tailEnd type="triangle"/>
+              </a:ln>
+            </p:spPr>
+            <p:style>
+              <a:lnRef idx="1">
+                <a:schemeClr val="accent1"/>
+              </a:lnRef>
+              <a:fillRef idx="0">
+                <a:schemeClr val="accent1"/>
+              </a:fillRef>
+              <a:effectRef idx="0">
+                <a:schemeClr val="accent1"/>
+              </a:effectRef>
+              <a:fontRef idx="minor">
+                <a:schemeClr val="tx1"/>
+              </a:fontRef>
+            </p:style>
+          </p:cxnSp>
+          <p:cxnSp>
+            <p:nvCxnSpPr>
+              <p:cNvPr id="65" name="Düz Bağlayıcı 64">
+                <a:extLst>
+                  <a:ext uri="{FF2B5EF4-FFF2-40B4-BE49-F238E27FC236}">
+                    <a16:creationId xmlns:a16="http://schemas.microsoft.com/office/drawing/2014/main" id="{0C7D7C59-D1CD-2642-8545-065218FA8E37}"/>
+                  </a:ext>
+                </a:extLst>
+              </p:cNvPr>
+              <p:cNvCxnSpPr>
+                <a:cxnSpLocks/>
+              </p:cNvCxnSpPr>
+              <p:nvPr/>
+            </p:nvCxnSpPr>
+            <p:spPr>
+              <a:xfrm flipV="1">
+                <a:off x="10094339" y="1234440"/>
+                <a:ext cx="379456" cy="1"/>
+              </a:xfrm>
+              <a:prstGeom prst="line">
+                <a:avLst/>
+              </a:prstGeom>
+              <a:ln w="31750">
+                <a:solidFill>
+                  <a:schemeClr val="accent6"/>
+                </a:solidFill>
+                <a:prstDash val="sysDot"/>
+              </a:ln>
+            </p:spPr>
+            <p:style>
+              <a:lnRef idx="1">
+                <a:schemeClr val="accent1"/>
+              </a:lnRef>
+              <a:fillRef idx="0">
+                <a:schemeClr val="accent1"/>
+              </a:fillRef>
+              <a:effectRef idx="0">
+                <a:schemeClr val="accent1"/>
+              </a:effectRef>
+              <a:fontRef idx="minor">
+                <a:schemeClr val="tx1"/>
+              </a:fontRef>
+            </p:style>
+          </p:cxnSp>
+          <p:sp>
+            <p:nvSpPr>
+              <p:cNvPr id="66" name="Metin kutusu 65">
+                <a:extLst>
+                  <a:ext uri="{FF2B5EF4-FFF2-40B4-BE49-F238E27FC236}">
+                    <a16:creationId xmlns:a16="http://schemas.microsoft.com/office/drawing/2014/main" id="{51AE4F97-CD17-3841-B153-78843BF603B1}"/>
+                  </a:ext>
+                </a:extLst>
+              </p:cNvPr>
+              <p:cNvSpPr txBox="1"/>
+              <p:nvPr/>
+            </p:nvSpPr>
+            <p:spPr>
+              <a:xfrm>
+                <a:off x="10473795" y="699373"/>
+                <a:ext cx="1100670" cy="324363"/>
+              </a:xfrm>
+              <a:prstGeom prst="rect">
+                <a:avLst/>
+              </a:prstGeom>
+              <a:noFill/>
+            </p:spPr>
+            <p:txBody>
+              <a:bodyPr wrap="none" rtlCol="0">
+                <a:spAutoFit/>
+              </a:bodyPr>
+              <a:lstStyle/>
+              <a:p>
+                <a:r>
+                  <a:rPr lang="en-US" sz="1200" dirty="0"/>
+                  <a:t>Linear velocity</a:t>
+                </a:r>
+              </a:p>
+            </p:txBody>
+          </p:sp>
+          <p:sp>
+            <p:nvSpPr>
+              <p:cNvPr id="67" name="Metin kutusu 66">
+                <a:extLst>
+                  <a:ext uri="{FF2B5EF4-FFF2-40B4-BE49-F238E27FC236}">
+                    <a16:creationId xmlns:a16="http://schemas.microsoft.com/office/drawing/2014/main" id="{6F0C2BD4-5FFC-254F-9500-CFA4E2424F59}"/>
+                  </a:ext>
+                </a:extLst>
+              </p:cNvPr>
+              <p:cNvSpPr txBox="1"/>
+              <p:nvPr/>
+            </p:nvSpPr>
+            <p:spPr>
+              <a:xfrm>
+                <a:off x="10473795" y="1049775"/>
+                <a:ext cx="1197672" cy="324363"/>
+              </a:xfrm>
+              <a:prstGeom prst="rect">
+                <a:avLst/>
+              </a:prstGeom>
+              <a:noFill/>
+            </p:spPr>
+            <p:txBody>
+              <a:bodyPr wrap="none" rtlCol="0">
+                <a:spAutoFit/>
+              </a:bodyPr>
+              <a:lstStyle/>
+              <a:p>
+                <a:r>
+                  <a:rPr lang="en-US" sz="1200" dirty="0"/>
+                  <a:t>Angular velocity</a:t>
+                </a:r>
+              </a:p>
+            </p:txBody>
+          </p:sp>
         </p:grpSp>
       </p:grpSp>
       <p:sp>
@@ -15151,8 +15704,8 @@
           <a:p>
             <a:pPr lvl="1"/>
             <a:r>
-              <a:rPr lang="en-US" dirty="0" err="1"/>
-              <a:t>Simulaton</a:t>
+              <a:rPr lang="en-US"/>
+              <a:t>Simulation</a:t>
             </a:r>
             <a:endParaRPr lang="en-US" dirty="0"/>
           </a:p>
@@ -15175,6 +15728,35 @@
             <a:r>
               <a:rPr lang="en-US" dirty="0"/>
               <a:t>Real world</a:t>
+            </a:r>
+          </a:p>
+          <a:p>
+            <a:pPr lvl="2"/>
+            <a:r>
+              <a:rPr lang="en-US" dirty="0"/>
+              <a:t>Attempt 1</a:t>
+            </a:r>
+          </a:p>
+          <a:p>
+            <a:pPr lvl="2"/>
+            <a:endParaRPr lang="en-US" dirty="0"/>
+          </a:p>
+          <a:p>
+            <a:pPr lvl="2"/>
+            <a:r>
+              <a:rPr lang="en-US" dirty="0"/>
+              <a:t>Attempt 2</a:t>
+            </a:r>
+          </a:p>
+          <a:p>
+            <a:pPr lvl="2"/>
+            <a:endParaRPr lang="en-US" dirty="0"/>
+          </a:p>
+          <a:p>
+            <a:pPr lvl="2"/>
+            <a:r>
+              <a:rPr lang="en-US" dirty="0"/>
+              <a:t>Attempt 2 different perspective</a:t>
             </a:r>
           </a:p>
           <a:p>
@@ -15311,6 +15893,104 @@
                 <a:hlinkClick r:id="rId4"/>
               </a:rPr>
               <a:t>/kJCo0gmgGCw</a:t>
+            </a:r>
+            <a:endParaRPr lang="en-US" sz="2400" dirty="0"/>
+          </a:p>
+        </p:txBody>
+      </p:sp>
+      <p:sp>
+        <p:nvSpPr>
+          <p:cNvPr id="8" name="Rechteck 1">
+            <a:extLst>
+              <a:ext uri="{FF2B5EF4-FFF2-40B4-BE49-F238E27FC236}">
+                <a16:creationId xmlns:a16="http://schemas.microsoft.com/office/drawing/2014/main" id="{087B8AFD-AA2C-D04D-9669-A1A5B6AD891D}"/>
+              </a:ext>
+            </a:extLst>
+          </p:cNvPr>
+          <p:cNvSpPr/>
+          <p:nvPr/>
+        </p:nvSpPr>
+        <p:spPr>
+          <a:xfrm>
+            <a:off x="1896697" y="3737619"/>
+            <a:ext cx="4530407" cy="461665"/>
+          </a:xfrm>
+          <a:prstGeom prst="rect">
+            <a:avLst/>
+          </a:prstGeom>
+        </p:spPr>
+        <p:txBody>
+          <a:bodyPr wrap="none">
+            <a:spAutoFit/>
+          </a:bodyPr>
+          <a:lstStyle/>
+          <a:p>
+            <a:r>
+              <a:rPr lang="en-US" sz="2400" dirty="0">
+                <a:hlinkClick r:id="rId5"/>
+              </a:rPr>
+              <a:t>https://</a:t>
+            </a:r>
+            <a:r>
+              <a:rPr lang="en-US" sz="2400" dirty="0" err="1">
+                <a:hlinkClick r:id="rId5"/>
+              </a:rPr>
+              <a:t>youtu.be</a:t>
+            </a:r>
+            <a:r>
+              <a:rPr lang="en-US" sz="2400" dirty="0">
+                <a:hlinkClick r:id="rId5"/>
+              </a:rPr>
+              <a:t>/XOWhKis15BE</a:t>
+            </a:r>
+            <a:endParaRPr lang="en-US" sz="2400" dirty="0"/>
+          </a:p>
+        </p:txBody>
+      </p:sp>
+      <p:sp>
+        <p:nvSpPr>
+          <p:cNvPr id="9" name="Rechteck 1">
+            <a:extLst>
+              <a:ext uri="{FF2B5EF4-FFF2-40B4-BE49-F238E27FC236}">
+                <a16:creationId xmlns:a16="http://schemas.microsoft.com/office/drawing/2014/main" id="{829662E5-081A-0149-A41C-265F0C7FA85E}"/>
+              </a:ext>
+            </a:extLst>
+          </p:cNvPr>
+          <p:cNvSpPr/>
+          <p:nvPr/>
+        </p:nvSpPr>
+        <p:spPr>
+          <a:xfrm>
+            <a:off x="1896697" y="4561161"/>
+            <a:ext cx="4152099" cy="461665"/>
+          </a:xfrm>
+          <a:prstGeom prst="rect">
+            <a:avLst/>
+          </a:prstGeom>
+        </p:spPr>
+        <p:txBody>
+          <a:bodyPr wrap="none">
+            <a:spAutoFit/>
+          </a:bodyPr>
+          <a:lstStyle/>
+          <a:p>
+            <a:r>
+              <a:rPr lang="en-US" sz="2400" dirty="0">
+                <a:hlinkClick r:id="rId6"/>
+              </a:rPr>
+              <a:t>https://</a:t>
+            </a:r>
+            <a:r>
+              <a:rPr lang="en-US" sz="2400" dirty="0" err="1">
+                <a:hlinkClick r:id="rId6"/>
+              </a:rPr>
+              <a:t>youtu.be</a:t>
+            </a:r>
+            <a:r>
+              <a:rPr lang="en-US" sz="2400" dirty="0">
+                <a:hlinkClick r:id="rId6"/>
+              </a:rPr>
+              <a:t>/Yj-vVpthBO0</a:t>
             </a:r>
             <a:endParaRPr lang="en-US" sz="2400" dirty="0"/>
           </a:p>

</xml_diff>